<commit_message>
Update main readme + questions
</commit_message>
<xml_diff>
--- a/CKA questions.pptx
+++ b/CKA questions.pptx
@@ -19,6 +19,12 @@
     <p:sldId id="267" r:id="rId13"/>
     <p:sldId id="268" r:id="rId14"/>
     <p:sldId id="270" r:id="rId15"/>
+    <p:sldId id="271" r:id="rId16"/>
+    <p:sldId id="272" r:id="rId17"/>
+    <p:sldId id="273" r:id="rId18"/>
+    <p:sldId id="274" r:id="rId19"/>
+    <p:sldId id="275" r:id="rId20"/>
+    <p:sldId id="276" r:id="rId21"/>
   </p:sldIdLst>
   <p:sldSz cx="12192000" cy="6858000"/>
   <p:notesSz cx="6858000" cy="9144000"/>
@@ -272,7 +278,7 @@
           <a:p>
             <a:fld id="{06DBD5CC-30A3-48EF-824F-9C02CBC81D3F}" type="datetimeFigureOut">
               <a:rPr lang="en-US" smtClean="0"/>
-              <a:t>5/15/2024</a:t>
+              <a:t>5/21/2024</a:t>
             </a:fld>
             <a:endParaRPr lang="en-US"/>
           </a:p>
@@ -470,7 +476,7 @@
           <a:p>
             <a:fld id="{06DBD5CC-30A3-48EF-824F-9C02CBC81D3F}" type="datetimeFigureOut">
               <a:rPr lang="en-US" smtClean="0"/>
-              <a:t>5/15/2024</a:t>
+              <a:t>5/21/2024</a:t>
             </a:fld>
             <a:endParaRPr lang="en-US"/>
           </a:p>
@@ -678,7 +684,7 @@
           <a:p>
             <a:fld id="{06DBD5CC-30A3-48EF-824F-9C02CBC81D3F}" type="datetimeFigureOut">
               <a:rPr lang="en-US" smtClean="0"/>
-              <a:t>5/15/2024</a:t>
+              <a:t>5/21/2024</a:t>
             </a:fld>
             <a:endParaRPr lang="en-US"/>
           </a:p>
@@ -876,7 +882,7 @@
           <a:p>
             <a:fld id="{06DBD5CC-30A3-48EF-824F-9C02CBC81D3F}" type="datetimeFigureOut">
               <a:rPr lang="en-US" smtClean="0"/>
-              <a:t>5/15/2024</a:t>
+              <a:t>5/21/2024</a:t>
             </a:fld>
             <a:endParaRPr lang="en-US"/>
           </a:p>
@@ -1151,7 +1157,7 @@
           <a:p>
             <a:fld id="{06DBD5CC-30A3-48EF-824F-9C02CBC81D3F}" type="datetimeFigureOut">
               <a:rPr lang="en-US" smtClean="0"/>
-              <a:t>5/15/2024</a:t>
+              <a:t>5/21/2024</a:t>
             </a:fld>
             <a:endParaRPr lang="en-US"/>
           </a:p>
@@ -1416,7 +1422,7 @@
           <a:p>
             <a:fld id="{06DBD5CC-30A3-48EF-824F-9C02CBC81D3F}" type="datetimeFigureOut">
               <a:rPr lang="en-US" smtClean="0"/>
-              <a:t>5/15/2024</a:t>
+              <a:t>5/21/2024</a:t>
             </a:fld>
             <a:endParaRPr lang="en-US"/>
           </a:p>
@@ -1828,7 +1834,7 @@
           <a:p>
             <a:fld id="{06DBD5CC-30A3-48EF-824F-9C02CBC81D3F}" type="datetimeFigureOut">
               <a:rPr lang="en-US" smtClean="0"/>
-              <a:t>5/15/2024</a:t>
+              <a:t>5/21/2024</a:t>
             </a:fld>
             <a:endParaRPr lang="en-US"/>
           </a:p>
@@ -1969,7 +1975,7 @@
           <a:p>
             <a:fld id="{06DBD5CC-30A3-48EF-824F-9C02CBC81D3F}" type="datetimeFigureOut">
               <a:rPr lang="en-US" smtClean="0"/>
-              <a:t>5/15/2024</a:t>
+              <a:t>5/21/2024</a:t>
             </a:fld>
             <a:endParaRPr lang="en-US"/>
           </a:p>
@@ -2082,7 +2088,7 @@
           <a:p>
             <a:fld id="{06DBD5CC-30A3-48EF-824F-9C02CBC81D3F}" type="datetimeFigureOut">
               <a:rPr lang="en-US" smtClean="0"/>
-              <a:t>5/15/2024</a:t>
+              <a:t>5/21/2024</a:t>
             </a:fld>
             <a:endParaRPr lang="en-US"/>
           </a:p>
@@ -2393,7 +2399,7 @@
           <a:p>
             <a:fld id="{06DBD5CC-30A3-48EF-824F-9C02CBC81D3F}" type="datetimeFigureOut">
               <a:rPr lang="en-US" smtClean="0"/>
-              <a:t>5/15/2024</a:t>
+              <a:t>5/21/2024</a:t>
             </a:fld>
             <a:endParaRPr lang="en-US"/>
           </a:p>
@@ -2681,7 +2687,7 @@
           <a:p>
             <a:fld id="{06DBD5CC-30A3-48EF-824F-9C02CBC81D3F}" type="datetimeFigureOut">
               <a:rPr lang="en-US" smtClean="0"/>
-              <a:t>5/15/2024</a:t>
+              <a:t>5/21/2024</a:t>
             </a:fld>
             <a:endParaRPr lang="en-US"/>
           </a:p>
@@ -2922,7 +2928,7 @@
           <a:p>
             <a:fld id="{06DBD5CC-30A3-48EF-824F-9C02CBC81D3F}" type="datetimeFigureOut">
               <a:rPr lang="en-US" smtClean="0"/>
-              <a:t>5/15/2024</a:t>
+              <a:t>5/21/2024</a:t>
             </a:fld>
             <a:endParaRPr lang="en-US"/>
           </a:p>
@@ -6546,6 +6552,2863 @@
 </p:sld>
 </file>
 
+<file path=ppt/slides/slide15.xml><?xml version="1.0" encoding="utf-8"?>
+<p:sld xmlns:a="http://schemas.openxmlformats.org/drawingml/2006/main" xmlns:r="http://schemas.openxmlformats.org/officeDocument/2006/relationships" xmlns:p="http://schemas.openxmlformats.org/presentationml/2006/main">
+  <p:cSld>
+    <p:spTree>
+      <p:nvGrpSpPr>
+        <p:cNvPr id="1" name=""/>
+        <p:cNvGrpSpPr/>
+        <p:nvPr/>
+      </p:nvGrpSpPr>
+      <p:grpSpPr>
+        <a:xfrm>
+          <a:off x="0" y="0"/>
+          <a:ext cx="0" cy="0"/>
+          <a:chOff x="0" y="0"/>
+          <a:chExt cx="0" cy="0"/>
+        </a:xfrm>
+      </p:grpSpPr>
+      <p:sp>
+        <p:nvSpPr>
+          <p:cNvPr id="5" name="Rectangle 2">
+            <a:extLst>
+              <a:ext uri="{FF2B5EF4-FFF2-40B4-BE49-F238E27FC236}">
+                <a16:creationId xmlns:a16="http://schemas.microsoft.com/office/drawing/2014/main" id="{F178CF33-752E-0E50-F24B-A2AF2687EBBE}"/>
+              </a:ext>
+            </a:extLst>
+          </p:cNvPr>
+          <p:cNvSpPr>
+            <a:spLocks noChangeArrowheads="1"/>
+          </p:cNvSpPr>
+          <p:nvPr/>
+        </p:nvSpPr>
+        <p:spPr bwMode="auto">
+          <a:xfrm rot="10800000" flipV="1">
+            <a:off x="3380198" y="991928"/>
+            <a:ext cx="3996647" cy="646331"/>
+          </a:xfrm>
+          <a:prstGeom prst="rect">
+            <a:avLst/>
+          </a:prstGeom>
+          <a:solidFill>
+            <a:srgbClr val="FFFFFF"/>
+          </a:solidFill>
+          <a:ln>
+            <a:noFill/>
+          </a:ln>
+          <a:effectLst/>
+          <a:extLst>
+            <a:ext uri="{91240B29-F687-4F45-9708-019B960494DF}">
+              <a14:hiddenLine xmlns:a14="http://schemas.microsoft.com/office/drawing/2010/main" w="9525">
+                <a:solidFill>
+                  <a:schemeClr val="tx1"/>
+                </a:solidFill>
+                <a:miter lim="800000"/>
+                <a:headEnd/>
+                <a:tailEnd/>
+              </a14:hiddenLine>
+            </a:ext>
+            <a:ext uri="{AF507438-7753-43E0-B8FC-AC1667EBCBE1}">
+              <a14:hiddenEffects xmlns:a14="http://schemas.microsoft.com/office/drawing/2010/main">
+                <a:effectLst>
+                  <a:outerShdw dist="35921" dir="2700000" algn="ctr" rotWithShape="0">
+                    <a:schemeClr val="bg2"/>
+                  </a:outerShdw>
+                </a:effectLst>
+              </a14:hiddenEffects>
+            </a:ext>
+          </a:extLst>
+        </p:spPr>
+        <p:txBody>
+          <a:bodyPr vert="horz" wrap="square" lIns="91440" tIns="45720" rIns="91440" bIns="45720" numCol="1" anchor="ctr" anchorCtr="0" compatLnSpc="1">
+            <a:prstTxWarp prst="textNoShape">
+              <a:avLst/>
+            </a:prstTxWarp>
+            <a:spAutoFit/>
+          </a:bodyPr>
+          <a:lstStyle>
+            <a:lvl1pPr eaLnBrk="0" fontAlgn="base" hangingPunct="0">
+              <a:spcBef>
+                <a:spcPct val="0"/>
+              </a:spcBef>
+              <a:spcAft>
+                <a:spcPct val="0"/>
+              </a:spcAft>
+              <a:defRPr>
+                <a:solidFill>
+                  <a:schemeClr val="tx1"/>
+                </a:solidFill>
+                <a:latin typeface="Arial" panose="020B0604020202020204" pitchFamily="34" charset="0"/>
+              </a:defRPr>
+            </a:lvl1pPr>
+            <a:lvl2pPr eaLnBrk="0" fontAlgn="base" hangingPunct="0">
+              <a:spcBef>
+                <a:spcPct val="0"/>
+              </a:spcBef>
+              <a:spcAft>
+                <a:spcPct val="0"/>
+              </a:spcAft>
+              <a:defRPr>
+                <a:solidFill>
+                  <a:schemeClr val="tx1"/>
+                </a:solidFill>
+                <a:latin typeface="Arial" panose="020B0604020202020204" pitchFamily="34" charset="0"/>
+              </a:defRPr>
+            </a:lvl2pPr>
+            <a:lvl3pPr eaLnBrk="0" fontAlgn="base" hangingPunct="0">
+              <a:spcBef>
+                <a:spcPct val="0"/>
+              </a:spcBef>
+              <a:spcAft>
+                <a:spcPct val="0"/>
+              </a:spcAft>
+              <a:defRPr>
+                <a:solidFill>
+                  <a:schemeClr val="tx1"/>
+                </a:solidFill>
+                <a:latin typeface="Arial" panose="020B0604020202020204" pitchFamily="34" charset="0"/>
+              </a:defRPr>
+            </a:lvl3pPr>
+            <a:lvl4pPr eaLnBrk="0" fontAlgn="base" hangingPunct="0">
+              <a:spcBef>
+                <a:spcPct val="0"/>
+              </a:spcBef>
+              <a:spcAft>
+                <a:spcPct val="0"/>
+              </a:spcAft>
+              <a:defRPr>
+                <a:solidFill>
+                  <a:schemeClr val="tx1"/>
+                </a:solidFill>
+                <a:latin typeface="Arial" panose="020B0604020202020204" pitchFamily="34" charset="0"/>
+              </a:defRPr>
+            </a:lvl4pPr>
+            <a:lvl5pPr eaLnBrk="0" fontAlgn="base" hangingPunct="0">
+              <a:spcBef>
+                <a:spcPct val="0"/>
+              </a:spcBef>
+              <a:spcAft>
+                <a:spcPct val="0"/>
+              </a:spcAft>
+              <a:defRPr>
+                <a:solidFill>
+                  <a:schemeClr val="tx1"/>
+                </a:solidFill>
+                <a:latin typeface="Arial" panose="020B0604020202020204" pitchFamily="34" charset="0"/>
+              </a:defRPr>
+            </a:lvl5pPr>
+            <a:lvl6pPr eaLnBrk="0" fontAlgn="base" hangingPunct="0">
+              <a:spcBef>
+                <a:spcPct val="0"/>
+              </a:spcBef>
+              <a:spcAft>
+                <a:spcPct val="0"/>
+              </a:spcAft>
+              <a:defRPr>
+                <a:solidFill>
+                  <a:schemeClr val="tx1"/>
+                </a:solidFill>
+                <a:latin typeface="Arial" panose="020B0604020202020204" pitchFamily="34" charset="0"/>
+              </a:defRPr>
+            </a:lvl6pPr>
+            <a:lvl7pPr eaLnBrk="0" fontAlgn="base" hangingPunct="0">
+              <a:spcBef>
+                <a:spcPct val="0"/>
+              </a:spcBef>
+              <a:spcAft>
+                <a:spcPct val="0"/>
+              </a:spcAft>
+              <a:defRPr>
+                <a:solidFill>
+                  <a:schemeClr val="tx1"/>
+                </a:solidFill>
+                <a:latin typeface="Arial" panose="020B0604020202020204" pitchFamily="34" charset="0"/>
+              </a:defRPr>
+            </a:lvl7pPr>
+            <a:lvl8pPr eaLnBrk="0" fontAlgn="base" hangingPunct="0">
+              <a:spcBef>
+                <a:spcPct val="0"/>
+              </a:spcBef>
+              <a:spcAft>
+                <a:spcPct val="0"/>
+              </a:spcAft>
+              <a:defRPr>
+                <a:solidFill>
+                  <a:schemeClr val="tx1"/>
+                </a:solidFill>
+                <a:latin typeface="Arial" panose="020B0604020202020204" pitchFamily="34" charset="0"/>
+              </a:defRPr>
+            </a:lvl8pPr>
+            <a:lvl9pPr eaLnBrk="0" fontAlgn="base" hangingPunct="0">
+              <a:spcBef>
+                <a:spcPct val="0"/>
+              </a:spcBef>
+              <a:spcAft>
+                <a:spcPct val="0"/>
+              </a:spcAft>
+              <a:defRPr>
+                <a:solidFill>
+                  <a:schemeClr val="tx1"/>
+                </a:solidFill>
+                <a:latin typeface="Arial" panose="020B0604020202020204" pitchFamily="34" charset="0"/>
+              </a:defRPr>
+            </a:lvl9pPr>
+          </a:lstStyle>
+          <a:p>
+            <a:pPr marL="0" marR="0" lvl="0" indent="0" algn="ctr" defTabSz="914400" rtl="0" eaLnBrk="0" fontAlgn="base" latinLnBrk="0" hangingPunct="0">
+              <a:lnSpc>
+                <a:spcPct val="100000"/>
+              </a:lnSpc>
+              <a:spcBef>
+                <a:spcPct val="0"/>
+              </a:spcBef>
+              <a:spcAft>
+                <a:spcPct val="0"/>
+              </a:spcAft>
+              <a:buClrTx/>
+              <a:buSzTx/>
+              <a:buFontTx/>
+              <a:buNone/>
+              <a:tabLst/>
+            </a:pPr>
+            <a:r>
+              <a:rPr lang="en-US" altLang="en-US" sz="3600" b="1" u="sng" dirty="0">
+                <a:solidFill>
+                  <a:schemeClr val="accent1"/>
+                </a:solidFill>
+              </a:rPr>
+              <a:t>Question # 15</a:t>
+            </a:r>
+          </a:p>
+        </p:txBody>
+      </p:sp>
+      <p:sp>
+        <p:nvSpPr>
+          <p:cNvPr id="6" name="Rectangle 2">
+            <a:extLst>
+              <a:ext uri="{FF2B5EF4-FFF2-40B4-BE49-F238E27FC236}">
+                <a16:creationId xmlns:a16="http://schemas.microsoft.com/office/drawing/2014/main" id="{6809B999-1DF9-69DB-1E04-15A7A3C2F00F}"/>
+              </a:ext>
+            </a:extLst>
+          </p:cNvPr>
+          <p:cNvSpPr>
+            <a:spLocks noChangeArrowheads="1"/>
+          </p:cNvSpPr>
+          <p:nvPr/>
+        </p:nvSpPr>
+        <p:spPr bwMode="auto">
+          <a:xfrm rot="10800000" flipV="1">
+            <a:off x="1571944" y="2486053"/>
+            <a:ext cx="8106313" cy="2677656"/>
+          </a:xfrm>
+          <a:prstGeom prst="rect">
+            <a:avLst/>
+          </a:prstGeom>
+          <a:solidFill>
+            <a:srgbClr val="FFFFFF"/>
+          </a:solidFill>
+          <a:ln>
+            <a:noFill/>
+          </a:ln>
+          <a:effectLst/>
+          <a:extLst>
+            <a:ext uri="{91240B29-F687-4F45-9708-019B960494DF}">
+              <a14:hiddenLine xmlns:a14="http://schemas.microsoft.com/office/drawing/2010/main" w="9525">
+                <a:solidFill>
+                  <a:schemeClr val="tx1"/>
+                </a:solidFill>
+                <a:miter lim="800000"/>
+                <a:headEnd/>
+                <a:tailEnd/>
+              </a14:hiddenLine>
+            </a:ext>
+            <a:ext uri="{AF507438-7753-43E0-B8FC-AC1667EBCBE1}">
+              <a14:hiddenEffects xmlns:a14="http://schemas.microsoft.com/office/drawing/2010/main">
+                <a:effectLst>
+                  <a:outerShdw dist="35921" dir="2700000" algn="ctr" rotWithShape="0">
+                    <a:schemeClr val="bg2"/>
+                  </a:outerShdw>
+                </a:effectLst>
+              </a14:hiddenEffects>
+            </a:ext>
+          </a:extLst>
+        </p:spPr>
+        <p:txBody>
+          <a:bodyPr vert="horz" wrap="square" lIns="91440" tIns="45720" rIns="91440" bIns="45720" numCol="1" anchor="ctr" anchorCtr="0" compatLnSpc="1">
+            <a:prstTxWarp prst="textNoShape">
+              <a:avLst/>
+            </a:prstTxWarp>
+            <a:spAutoFit/>
+          </a:bodyPr>
+          <a:lstStyle>
+            <a:lvl1pPr eaLnBrk="0" fontAlgn="base" hangingPunct="0">
+              <a:spcBef>
+                <a:spcPct val="0"/>
+              </a:spcBef>
+              <a:spcAft>
+                <a:spcPct val="0"/>
+              </a:spcAft>
+              <a:defRPr>
+                <a:solidFill>
+                  <a:schemeClr val="tx1"/>
+                </a:solidFill>
+                <a:latin typeface="Arial" panose="020B0604020202020204" pitchFamily="34" charset="0"/>
+              </a:defRPr>
+            </a:lvl1pPr>
+            <a:lvl2pPr eaLnBrk="0" fontAlgn="base" hangingPunct="0">
+              <a:spcBef>
+                <a:spcPct val="0"/>
+              </a:spcBef>
+              <a:spcAft>
+                <a:spcPct val="0"/>
+              </a:spcAft>
+              <a:defRPr>
+                <a:solidFill>
+                  <a:schemeClr val="tx1"/>
+                </a:solidFill>
+                <a:latin typeface="Arial" panose="020B0604020202020204" pitchFamily="34" charset="0"/>
+              </a:defRPr>
+            </a:lvl2pPr>
+            <a:lvl3pPr eaLnBrk="0" fontAlgn="base" hangingPunct="0">
+              <a:spcBef>
+                <a:spcPct val="0"/>
+              </a:spcBef>
+              <a:spcAft>
+                <a:spcPct val="0"/>
+              </a:spcAft>
+              <a:defRPr>
+                <a:solidFill>
+                  <a:schemeClr val="tx1"/>
+                </a:solidFill>
+                <a:latin typeface="Arial" panose="020B0604020202020204" pitchFamily="34" charset="0"/>
+              </a:defRPr>
+            </a:lvl3pPr>
+            <a:lvl4pPr eaLnBrk="0" fontAlgn="base" hangingPunct="0">
+              <a:spcBef>
+                <a:spcPct val="0"/>
+              </a:spcBef>
+              <a:spcAft>
+                <a:spcPct val="0"/>
+              </a:spcAft>
+              <a:defRPr>
+                <a:solidFill>
+                  <a:schemeClr val="tx1"/>
+                </a:solidFill>
+                <a:latin typeface="Arial" panose="020B0604020202020204" pitchFamily="34" charset="0"/>
+              </a:defRPr>
+            </a:lvl4pPr>
+            <a:lvl5pPr eaLnBrk="0" fontAlgn="base" hangingPunct="0">
+              <a:spcBef>
+                <a:spcPct val="0"/>
+              </a:spcBef>
+              <a:spcAft>
+                <a:spcPct val="0"/>
+              </a:spcAft>
+              <a:defRPr>
+                <a:solidFill>
+                  <a:schemeClr val="tx1"/>
+                </a:solidFill>
+                <a:latin typeface="Arial" panose="020B0604020202020204" pitchFamily="34" charset="0"/>
+              </a:defRPr>
+            </a:lvl5pPr>
+            <a:lvl6pPr eaLnBrk="0" fontAlgn="base" hangingPunct="0">
+              <a:spcBef>
+                <a:spcPct val="0"/>
+              </a:spcBef>
+              <a:spcAft>
+                <a:spcPct val="0"/>
+              </a:spcAft>
+              <a:defRPr>
+                <a:solidFill>
+                  <a:schemeClr val="tx1"/>
+                </a:solidFill>
+                <a:latin typeface="Arial" panose="020B0604020202020204" pitchFamily="34" charset="0"/>
+              </a:defRPr>
+            </a:lvl6pPr>
+            <a:lvl7pPr eaLnBrk="0" fontAlgn="base" hangingPunct="0">
+              <a:spcBef>
+                <a:spcPct val="0"/>
+              </a:spcBef>
+              <a:spcAft>
+                <a:spcPct val="0"/>
+              </a:spcAft>
+              <a:defRPr>
+                <a:solidFill>
+                  <a:schemeClr val="tx1"/>
+                </a:solidFill>
+                <a:latin typeface="Arial" panose="020B0604020202020204" pitchFamily="34" charset="0"/>
+              </a:defRPr>
+            </a:lvl7pPr>
+            <a:lvl8pPr eaLnBrk="0" fontAlgn="base" hangingPunct="0">
+              <a:spcBef>
+                <a:spcPct val="0"/>
+              </a:spcBef>
+              <a:spcAft>
+                <a:spcPct val="0"/>
+              </a:spcAft>
+              <a:defRPr>
+                <a:solidFill>
+                  <a:schemeClr val="tx1"/>
+                </a:solidFill>
+                <a:latin typeface="Arial" panose="020B0604020202020204" pitchFamily="34" charset="0"/>
+              </a:defRPr>
+            </a:lvl8pPr>
+            <a:lvl9pPr eaLnBrk="0" fontAlgn="base" hangingPunct="0">
+              <a:spcBef>
+                <a:spcPct val="0"/>
+              </a:spcBef>
+              <a:spcAft>
+                <a:spcPct val="0"/>
+              </a:spcAft>
+              <a:defRPr>
+                <a:solidFill>
+                  <a:schemeClr val="tx1"/>
+                </a:solidFill>
+                <a:latin typeface="Arial" panose="020B0604020202020204" pitchFamily="34" charset="0"/>
+              </a:defRPr>
+            </a:lvl9pPr>
+          </a:lstStyle>
+          <a:p>
+            <a:pPr marL="0" marR="0" lvl="0" indent="0" algn="ctr" defTabSz="914400" rtl="0" eaLnBrk="0" fontAlgn="base" latinLnBrk="0" hangingPunct="0">
+              <a:lnSpc>
+                <a:spcPct val="100000"/>
+              </a:lnSpc>
+              <a:spcBef>
+                <a:spcPct val="0"/>
+              </a:spcBef>
+              <a:spcAft>
+                <a:spcPct val="0"/>
+              </a:spcAft>
+              <a:buClrTx/>
+              <a:buSzTx/>
+              <a:buFontTx/>
+              <a:buNone/>
+              <a:tabLst/>
+            </a:pPr>
+            <a:r>
+              <a:rPr lang="en-US" altLang="en-US" sz="2400" dirty="0"/>
+              <a:t>There are various pods in all </a:t>
+            </a:r>
+            <a:r>
+              <a:rPr lang="en-US" altLang="en-US" sz="2400" dirty="0" err="1"/>
+              <a:t>namespaces.Write</a:t>
+            </a:r>
+            <a:r>
+              <a:rPr lang="en-US" altLang="en-US" sz="2400" dirty="0"/>
+              <a:t> a command into /opt/course/5/find_pods.sh which lists all pods sorted by their age (</a:t>
+            </a:r>
+            <a:r>
+              <a:rPr lang="en-US" altLang="en-US" sz="2400" dirty="0" err="1"/>
+              <a:t>metadata.creationTimestamp</a:t>
+            </a:r>
+            <a:r>
+              <a:rPr lang="en-US" altLang="en-US" sz="2400" dirty="0"/>
+              <a:t>).</a:t>
+            </a:r>
+          </a:p>
+          <a:p>
+            <a:pPr marL="0" marR="0" lvl="0" indent="0" algn="ctr" defTabSz="914400" rtl="0" eaLnBrk="0" fontAlgn="base" latinLnBrk="0" hangingPunct="0">
+              <a:lnSpc>
+                <a:spcPct val="100000"/>
+              </a:lnSpc>
+              <a:spcBef>
+                <a:spcPct val="0"/>
+              </a:spcBef>
+              <a:spcAft>
+                <a:spcPct val="0"/>
+              </a:spcAft>
+              <a:buClrTx/>
+              <a:buSzTx/>
+              <a:buFontTx/>
+              <a:buNone/>
+              <a:tabLst/>
+            </a:pPr>
+            <a:r>
+              <a:rPr lang="en-US" altLang="en-US" sz="2400" dirty="0"/>
+              <a:t>Write a second command into /opt/course/5/find_pods_uid.sh which lists all pods sorted by field </a:t>
+            </a:r>
+            <a:r>
+              <a:rPr lang="en-US" altLang="en-US" sz="2400" dirty="0" err="1"/>
+              <a:t>metadata.uid</a:t>
+            </a:r>
+            <a:r>
+              <a:rPr lang="en-US" altLang="en-US" sz="2400" dirty="0"/>
+              <a:t>. Use </a:t>
+            </a:r>
+            <a:r>
+              <a:rPr lang="en-US" altLang="en-US" sz="2400" dirty="0" err="1"/>
+              <a:t>kubectl</a:t>
+            </a:r>
+            <a:r>
+              <a:rPr lang="en-US" altLang="en-US" sz="2400" dirty="0"/>
+              <a:t> sorting for both commands</a:t>
+            </a:r>
+          </a:p>
+        </p:txBody>
+      </p:sp>
+    </p:spTree>
+    <p:extLst>
+      <p:ext uri="{BB962C8B-B14F-4D97-AF65-F5344CB8AC3E}">
+        <p14:creationId xmlns:p14="http://schemas.microsoft.com/office/powerpoint/2010/main" val="2350600017"/>
+      </p:ext>
+    </p:extLst>
+  </p:cSld>
+  <p:clrMapOvr>
+    <a:masterClrMapping/>
+  </p:clrMapOvr>
+</p:sld>
+</file>
+
+<file path=ppt/slides/slide16.xml><?xml version="1.0" encoding="utf-8"?>
+<p:sld xmlns:a="http://schemas.openxmlformats.org/drawingml/2006/main" xmlns:r="http://schemas.openxmlformats.org/officeDocument/2006/relationships" xmlns:p="http://schemas.openxmlformats.org/presentationml/2006/main">
+  <p:cSld>
+    <p:spTree>
+      <p:nvGrpSpPr>
+        <p:cNvPr id="1" name=""/>
+        <p:cNvGrpSpPr/>
+        <p:nvPr/>
+      </p:nvGrpSpPr>
+      <p:grpSpPr>
+        <a:xfrm>
+          <a:off x="0" y="0"/>
+          <a:ext cx="0" cy="0"/>
+          <a:chOff x="0" y="0"/>
+          <a:chExt cx="0" cy="0"/>
+        </a:xfrm>
+      </p:grpSpPr>
+      <p:sp>
+        <p:nvSpPr>
+          <p:cNvPr id="5" name="Rectangle 2">
+            <a:extLst>
+              <a:ext uri="{FF2B5EF4-FFF2-40B4-BE49-F238E27FC236}">
+                <a16:creationId xmlns:a16="http://schemas.microsoft.com/office/drawing/2014/main" id="{F178CF33-752E-0E50-F24B-A2AF2687EBBE}"/>
+              </a:ext>
+            </a:extLst>
+          </p:cNvPr>
+          <p:cNvSpPr>
+            <a:spLocks noChangeArrowheads="1"/>
+          </p:cNvSpPr>
+          <p:nvPr/>
+        </p:nvSpPr>
+        <p:spPr bwMode="auto">
+          <a:xfrm rot="10800000" flipV="1">
+            <a:off x="3380198" y="991928"/>
+            <a:ext cx="3996647" cy="646331"/>
+          </a:xfrm>
+          <a:prstGeom prst="rect">
+            <a:avLst/>
+          </a:prstGeom>
+          <a:solidFill>
+            <a:srgbClr val="FFFFFF"/>
+          </a:solidFill>
+          <a:ln>
+            <a:noFill/>
+          </a:ln>
+          <a:effectLst/>
+          <a:extLst>
+            <a:ext uri="{91240B29-F687-4F45-9708-019B960494DF}">
+              <a14:hiddenLine xmlns:a14="http://schemas.microsoft.com/office/drawing/2010/main" w="9525">
+                <a:solidFill>
+                  <a:schemeClr val="tx1"/>
+                </a:solidFill>
+                <a:miter lim="800000"/>
+                <a:headEnd/>
+                <a:tailEnd/>
+              </a14:hiddenLine>
+            </a:ext>
+            <a:ext uri="{AF507438-7753-43E0-B8FC-AC1667EBCBE1}">
+              <a14:hiddenEffects xmlns:a14="http://schemas.microsoft.com/office/drawing/2010/main">
+                <a:effectLst>
+                  <a:outerShdw dist="35921" dir="2700000" algn="ctr" rotWithShape="0">
+                    <a:schemeClr val="bg2"/>
+                  </a:outerShdw>
+                </a:effectLst>
+              </a14:hiddenEffects>
+            </a:ext>
+          </a:extLst>
+        </p:spPr>
+        <p:txBody>
+          <a:bodyPr vert="horz" wrap="square" lIns="91440" tIns="45720" rIns="91440" bIns="45720" numCol="1" anchor="ctr" anchorCtr="0" compatLnSpc="1">
+            <a:prstTxWarp prst="textNoShape">
+              <a:avLst/>
+            </a:prstTxWarp>
+            <a:spAutoFit/>
+          </a:bodyPr>
+          <a:lstStyle>
+            <a:lvl1pPr eaLnBrk="0" fontAlgn="base" hangingPunct="0">
+              <a:spcBef>
+                <a:spcPct val="0"/>
+              </a:spcBef>
+              <a:spcAft>
+                <a:spcPct val="0"/>
+              </a:spcAft>
+              <a:defRPr>
+                <a:solidFill>
+                  <a:schemeClr val="tx1"/>
+                </a:solidFill>
+                <a:latin typeface="Arial" panose="020B0604020202020204" pitchFamily="34" charset="0"/>
+              </a:defRPr>
+            </a:lvl1pPr>
+            <a:lvl2pPr eaLnBrk="0" fontAlgn="base" hangingPunct="0">
+              <a:spcBef>
+                <a:spcPct val="0"/>
+              </a:spcBef>
+              <a:spcAft>
+                <a:spcPct val="0"/>
+              </a:spcAft>
+              <a:defRPr>
+                <a:solidFill>
+                  <a:schemeClr val="tx1"/>
+                </a:solidFill>
+                <a:latin typeface="Arial" panose="020B0604020202020204" pitchFamily="34" charset="0"/>
+              </a:defRPr>
+            </a:lvl2pPr>
+            <a:lvl3pPr eaLnBrk="0" fontAlgn="base" hangingPunct="0">
+              <a:spcBef>
+                <a:spcPct val="0"/>
+              </a:spcBef>
+              <a:spcAft>
+                <a:spcPct val="0"/>
+              </a:spcAft>
+              <a:defRPr>
+                <a:solidFill>
+                  <a:schemeClr val="tx1"/>
+                </a:solidFill>
+                <a:latin typeface="Arial" panose="020B0604020202020204" pitchFamily="34" charset="0"/>
+              </a:defRPr>
+            </a:lvl3pPr>
+            <a:lvl4pPr eaLnBrk="0" fontAlgn="base" hangingPunct="0">
+              <a:spcBef>
+                <a:spcPct val="0"/>
+              </a:spcBef>
+              <a:spcAft>
+                <a:spcPct val="0"/>
+              </a:spcAft>
+              <a:defRPr>
+                <a:solidFill>
+                  <a:schemeClr val="tx1"/>
+                </a:solidFill>
+                <a:latin typeface="Arial" panose="020B0604020202020204" pitchFamily="34" charset="0"/>
+              </a:defRPr>
+            </a:lvl4pPr>
+            <a:lvl5pPr eaLnBrk="0" fontAlgn="base" hangingPunct="0">
+              <a:spcBef>
+                <a:spcPct val="0"/>
+              </a:spcBef>
+              <a:spcAft>
+                <a:spcPct val="0"/>
+              </a:spcAft>
+              <a:defRPr>
+                <a:solidFill>
+                  <a:schemeClr val="tx1"/>
+                </a:solidFill>
+                <a:latin typeface="Arial" panose="020B0604020202020204" pitchFamily="34" charset="0"/>
+              </a:defRPr>
+            </a:lvl5pPr>
+            <a:lvl6pPr eaLnBrk="0" fontAlgn="base" hangingPunct="0">
+              <a:spcBef>
+                <a:spcPct val="0"/>
+              </a:spcBef>
+              <a:spcAft>
+                <a:spcPct val="0"/>
+              </a:spcAft>
+              <a:defRPr>
+                <a:solidFill>
+                  <a:schemeClr val="tx1"/>
+                </a:solidFill>
+                <a:latin typeface="Arial" panose="020B0604020202020204" pitchFamily="34" charset="0"/>
+              </a:defRPr>
+            </a:lvl6pPr>
+            <a:lvl7pPr eaLnBrk="0" fontAlgn="base" hangingPunct="0">
+              <a:spcBef>
+                <a:spcPct val="0"/>
+              </a:spcBef>
+              <a:spcAft>
+                <a:spcPct val="0"/>
+              </a:spcAft>
+              <a:defRPr>
+                <a:solidFill>
+                  <a:schemeClr val="tx1"/>
+                </a:solidFill>
+                <a:latin typeface="Arial" panose="020B0604020202020204" pitchFamily="34" charset="0"/>
+              </a:defRPr>
+            </a:lvl7pPr>
+            <a:lvl8pPr eaLnBrk="0" fontAlgn="base" hangingPunct="0">
+              <a:spcBef>
+                <a:spcPct val="0"/>
+              </a:spcBef>
+              <a:spcAft>
+                <a:spcPct val="0"/>
+              </a:spcAft>
+              <a:defRPr>
+                <a:solidFill>
+                  <a:schemeClr val="tx1"/>
+                </a:solidFill>
+                <a:latin typeface="Arial" panose="020B0604020202020204" pitchFamily="34" charset="0"/>
+              </a:defRPr>
+            </a:lvl8pPr>
+            <a:lvl9pPr eaLnBrk="0" fontAlgn="base" hangingPunct="0">
+              <a:spcBef>
+                <a:spcPct val="0"/>
+              </a:spcBef>
+              <a:spcAft>
+                <a:spcPct val="0"/>
+              </a:spcAft>
+              <a:defRPr>
+                <a:solidFill>
+                  <a:schemeClr val="tx1"/>
+                </a:solidFill>
+                <a:latin typeface="Arial" panose="020B0604020202020204" pitchFamily="34" charset="0"/>
+              </a:defRPr>
+            </a:lvl9pPr>
+          </a:lstStyle>
+          <a:p>
+            <a:pPr marL="0" marR="0" lvl="0" indent="0" algn="ctr" defTabSz="914400" rtl="0" eaLnBrk="0" fontAlgn="base" latinLnBrk="0" hangingPunct="0">
+              <a:lnSpc>
+                <a:spcPct val="100000"/>
+              </a:lnSpc>
+              <a:spcBef>
+                <a:spcPct val="0"/>
+              </a:spcBef>
+              <a:spcAft>
+                <a:spcPct val="0"/>
+              </a:spcAft>
+              <a:buClrTx/>
+              <a:buSzTx/>
+              <a:buFontTx/>
+              <a:buNone/>
+              <a:tabLst/>
+            </a:pPr>
+            <a:r>
+              <a:rPr lang="en-US" altLang="en-US" sz="3600" b="1" u="sng" dirty="0">
+                <a:solidFill>
+                  <a:schemeClr val="accent1"/>
+                </a:solidFill>
+              </a:rPr>
+              <a:t>Question # 16</a:t>
+            </a:r>
+          </a:p>
+        </p:txBody>
+      </p:sp>
+      <p:sp>
+        <p:nvSpPr>
+          <p:cNvPr id="6" name="Rectangle 2">
+            <a:extLst>
+              <a:ext uri="{FF2B5EF4-FFF2-40B4-BE49-F238E27FC236}">
+                <a16:creationId xmlns:a16="http://schemas.microsoft.com/office/drawing/2014/main" id="{6809B999-1DF9-69DB-1E04-15A7A3C2F00F}"/>
+              </a:ext>
+            </a:extLst>
+          </p:cNvPr>
+          <p:cNvSpPr>
+            <a:spLocks noChangeArrowheads="1"/>
+          </p:cNvSpPr>
+          <p:nvPr/>
+        </p:nvSpPr>
+        <p:spPr bwMode="auto">
+          <a:xfrm rot="10800000" flipV="1">
+            <a:off x="1674686" y="2423332"/>
+            <a:ext cx="8106313" cy="1200329"/>
+          </a:xfrm>
+          <a:prstGeom prst="rect">
+            <a:avLst/>
+          </a:prstGeom>
+          <a:solidFill>
+            <a:srgbClr val="FFFFFF"/>
+          </a:solidFill>
+          <a:ln>
+            <a:noFill/>
+          </a:ln>
+          <a:effectLst/>
+          <a:extLst>
+            <a:ext uri="{91240B29-F687-4F45-9708-019B960494DF}">
+              <a14:hiddenLine xmlns:a14="http://schemas.microsoft.com/office/drawing/2010/main" w="9525">
+                <a:solidFill>
+                  <a:schemeClr val="tx1"/>
+                </a:solidFill>
+                <a:miter lim="800000"/>
+                <a:headEnd/>
+                <a:tailEnd/>
+              </a14:hiddenLine>
+            </a:ext>
+            <a:ext uri="{AF507438-7753-43E0-B8FC-AC1667EBCBE1}">
+              <a14:hiddenEffects xmlns:a14="http://schemas.microsoft.com/office/drawing/2010/main">
+                <a:effectLst>
+                  <a:outerShdw dist="35921" dir="2700000" algn="ctr" rotWithShape="0">
+                    <a:schemeClr val="bg2"/>
+                  </a:outerShdw>
+                </a:effectLst>
+              </a14:hiddenEffects>
+            </a:ext>
+          </a:extLst>
+        </p:spPr>
+        <p:txBody>
+          <a:bodyPr vert="horz" wrap="square" lIns="91440" tIns="45720" rIns="91440" bIns="45720" numCol="1" anchor="ctr" anchorCtr="0" compatLnSpc="1">
+            <a:prstTxWarp prst="textNoShape">
+              <a:avLst/>
+            </a:prstTxWarp>
+            <a:spAutoFit/>
+          </a:bodyPr>
+          <a:lstStyle>
+            <a:lvl1pPr eaLnBrk="0" fontAlgn="base" hangingPunct="0">
+              <a:spcBef>
+                <a:spcPct val="0"/>
+              </a:spcBef>
+              <a:spcAft>
+                <a:spcPct val="0"/>
+              </a:spcAft>
+              <a:defRPr>
+                <a:solidFill>
+                  <a:schemeClr val="tx1"/>
+                </a:solidFill>
+                <a:latin typeface="Arial" panose="020B0604020202020204" pitchFamily="34" charset="0"/>
+              </a:defRPr>
+            </a:lvl1pPr>
+            <a:lvl2pPr eaLnBrk="0" fontAlgn="base" hangingPunct="0">
+              <a:spcBef>
+                <a:spcPct val="0"/>
+              </a:spcBef>
+              <a:spcAft>
+                <a:spcPct val="0"/>
+              </a:spcAft>
+              <a:defRPr>
+                <a:solidFill>
+                  <a:schemeClr val="tx1"/>
+                </a:solidFill>
+                <a:latin typeface="Arial" panose="020B0604020202020204" pitchFamily="34" charset="0"/>
+              </a:defRPr>
+            </a:lvl2pPr>
+            <a:lvl3pPr eaLnBrk="0" fontAlgn="base" hangingPunct="0">
+              <a:spcBef>
+                <a:spcPct val="0"/>
+              </a:spcBef>
+              <a:spcAft>
+                <a:spcPct val="0"/>
+              </a:spcAft>
+              <a:defRPr>
+                <a:solidFill>
+                  <a:schemeClr val="tx1"/>
+                </a:solidFill>
+                <a:latin typeface="Arial" panose="020B0604020202020204" pitchFamily="34" charset="0"/>
+              </a:defRPr>
+            </a:lvl3pPr>
+            <a:lvl4pPr eaLnBrk="0" fontAlgn="base" hangingPunct="0">
+              <a:spcBef>
+                <a:spcPct val="0"/>
+              </a:spcBef>
+              <a:spcAft>
+                <a:spcPct val="0"/>
+              </a:spcAft>
+              <a:defRPr>
+                <a:solidFill>
+                  <a:schemeClr val="tx1"/>
+                </a:solidFill>
+                <a:latin typeface="Arial" panose="020B0604020202020204" pitchFamily="34" charset="0"/>
+              </a:defRPr>
+            </a:lvl4pPr>
+            <a:lvl5pPr eaLnBrk="0" fontAlgn="base" hangingPunct="0">
+              <a:spcBef>
+                <a:spcPct val="0"/>
+              </a:spcBef>
+              <a:spcAft>
+                <a:spcPct val="0"/>
+              </a:spcAft>
+              <a:defRPr>
+                <a:solidFill>
+                  <a:schemeClr val="tx1"/>
+                </a:solidFill>
+                <a:latin typeface="Arial" panose="020B0604020202020204" pitchFamily="34" charset="0"/>
+              </a:defRPr>
+            </a:lvl5pPr>
+            <a:lvl6pPr eaLnBrk="0" fontAlgn="base" hangingPunct="0">
+              <a:spcBef>
+                <a:spcPct val="0"/>
+              </a:spcBef>
+              <a:spcAft>
+                <a:spcPct val="0"/>
+              </a:spcAft>
+              <a:defRPr>
+                <a:solidFill>
+                  <a:schemeClr val="tx1"/>
+                </a:solidFill>
+                <a:latin typeface="Arial" panose="020B0604020202020204" pitchFamily="34" charset="0"/>
+              </a:defRPr>
+            </a:lvl6pPr>
+            <a:lvl7pPr eaLnBrk="0" fontAlgn="base" hangingPunct="0">
+              <a:spcBef>
+                <a:spcPct val="0"/>
+              </a:spcBef>
+              <a:spcAft>
+                <a:spcPct val="0"/>
+              </a:spcAft>
+              <a:defRPr>
+                <a:solidFill>
+                  <a:schemeClr val="tx1"/>
+                </a:solidFill>
+                <a:latin typeface="Arial" panose="020B0604020202020204" pitchFamily="34" charset="0"/>
+              </a:defRPr>
+            </a:lvl7pPr>
+            <a:lvl8pPr eaLnBrk="0" fontAlgn="base" hangingPunct="0">
+              <a:spcBef>
+                <a:spcPct val="0"/>
+              </a:spcBef>
+              <a:spcAft>
+                <a:spcPct val="0"/>
+              </a:spcAft>
+              <a:defRPr>
+                <a:solidFill>
+                  <a:schemeClr val="tx1"/>
+                </a:solidFill>
+                <a:latin typeface="Arial" panose="020B0604020202020204" pitchFamily="34" charset="0"/>
+              </a:defRPr>
+            </a:lvl8pPr>
+            <a:lvl9pPr eaLnBrk="0" fontAlgn="base" hangingPunct="0">
+              <a:spcBef>
+                <a:spcPct val="0"/>
+              </a:spcBef>
+              <a:spcAft>
+                <a:spcPct val="0"/>
+              </a:spcAft>
+              <a:defRPr>
+                <a:solidFill>
+                  <a:schemeClr val="tx1"/>
+                </a:solidFill>
+                <a:latin typeface="Arial" panose="020B0604020202020204" pitchFamily="34" charset="0"/>
+              </a:defRPr>
+            </a:lvl9pPr>
+          </a:lstStyle>
+          <a:p>
+            <a:pPr marL="0" marR="0" lvl="0" indent="0" algn="ctr" defTabSz="914400" rtl="0" eaLnBrk="0" fontAlgn="base" latinLnBrk="0" hangingPunct="0">
+              <a:lnSpc>
+                <a:spcPct val="100000"/>
+              </a:lnSpc>
+              <a:spcBef>
+                <a:spcPct val="0"/>
+              </a:spcBef>
+              <a:spcAft>
+                <a:spcPct val="0"/>
+              </a:spcAft>
+              <a:buClrTx/>
+              <a:buSzTx/>
+              <a:buFontTx/>
+              <a:buNone/>
+              <a:tabLst/>
+            </a:pPr>
+            <a:r>
+              <a:rPr lang="en-US" altLang="en-US" sz="2400" dirty="0"/>
+              <a:t>Upgrade the cluster (master and worker node) from 1.29.0 to 1.29.5-1.1.Make sure to first drain both node and make it available after upgrade</a:t>
+            </a:r>
+          </a:p>
+        </p:txBody>
+      </p:sp>
+    </p:spTree>
+    <p:extLst>
+      <p:ext uri="{BB962C8B-B14F-4D97-AF65-F5344CB8AC3E}">
+        <p14:creationId xmlns:p14="http://schemas.microsoft.com/office/powerpoint/2010/main" val="4161276119"/>
+      </p:ext>
+    </p:extLst>
+  </p:cSld>
+  <p:clrMapOvr>
+    <a:masterClrMapping/>
+  </p:clrMapOvr>
+</p:sld>
+</file>
+
+<file path=ppt/slides/slide17.xml><?xml version="1.0" encoding="utf-8"?>
+<p:sld xmlns:a="http://schemas.openxmlformats.org/drawingml/2006/main" xmlns:r="http://schemas.openxmlformats.org/officeDocument/2006/relationships" xmlns:p="http://schemas.openxmlformats.org/presentationml/2006/main">
+  <p:cSld>
+    <p:spTree>
+      <p:nvGrpSpPr>
+        <p:cNvPr id="1" name=""/>
+        <p:cNvGrpSpPr/>
+        <p:nvPr/>
+      </p:nvGrpSpPr>
+      <p:grpSpPr>
+        <a:xfrm>
+          <a:off x="0" y="0"/>
+          <a:ext cx="0" cy="0"/>
+          <a:chOff x="0" y="0"/>
+          <a:chExt cx="0" cy="0"/>
+        </a:xfrm>
+      </p:grpSpPr>
+      <p:sp>
+        <p:nvSpPr>
+          <p:cNvPr id="5" name="Rectangle 2">
+            <a:extLst>
+              <a:ext uri="{FF2B5EF4-FFF2-40B4-BE49-F238E27FC236}">
+                <a16:creationId xmlns:a16="http://schemas.microsoft.com/office/drawing/2014/main" id="{F178CF33-752E-0E50-F24B-A2AF2687EBBE}"/>
+              </a:ext>
+            </a:extLst>
+          </p:cNvPr>
+          <p:cNvSpPr>
+            <a:spLocks noChangeArrowheads="1"/>
+          </p:cNvSpPr>
+          <p:nvPr/>
+        </p:nvSpPr>
+        <p:spPr bwMode="auto">
+          <a:xfrm rot="10800000" flipV="1">
+            <a:off x="3380198" y="991928"/>
+            <a:ext cx="3996647" cy="646331"/>
+          </a:xfrm>
+          <a:prstGeom prst="rect">
+            <a:avLst/>
+          </a:prstGeom>
+          <a:solidFill>
+            <a:srgbClr val="FFFFFF"/>
+          </a:solidFill>
+          <a:ln>
+            <a:noFill/>
+          </a:ln>
+          <a:effectLst/>
+          <a:extLst>
+            <a:ext uri="{91240B29-F687-4F45-9708-019B960494DF}">
+              <a14:hiddenLine xmlns:a14="http://schemas.microsoft.com/office/drawing/2010/main" w="9525">
+                <a:solidFill>
+                  <a:schemeClr val="tx1"/>
+                </a:solidFill>
+                <a:miter lim="800000"/>
+                <a:headEnd/>
+                <a:tailEnd/>
+              </a14:hiddenLine>
+            </a:ext>
+            <a:ext uri="{AF507438-7753-43E0-B8FC-AC1667EBCBE1}">
+              <a14:hiddenEffects xmlns:a14="http://schemas.microsoft.com/office/drawing/2010/main">
+                <a:effectLst>
+                  <a:outerShdw dist="35921" dir="2700000" algn="ctr" rotWithShape="0">
+                    <a:schemeClr val="bg2"/>
+                  </a:outerShdw>
+                </a:effectLst>
+              </a14:hiddenEffects>
+            </a:ext>
+          </a:extLst>
+        </p:spPr>
+        <p:txBody>
+          <a:bodyPr vert="horz" wrap="square" lIns="91440" tIns="45720" rIns="91440" bIns="45720" numCol="1" anchor="ctr" anchorCtr="0" compatLnSpc="1">
+            <a:prstTxWarp prst="textNoShape">
+              <a:avLst/>
+            </a:prstTxWarp>
+            <a:spAutoFit/>
+          </a:bodyPr>
+          <a:lstStyle>
+            <a:lvl1pPr eaLnBrk="0" fontAlgn="base" hangingPunct="0">
+              <a:spcBef>
+                <a:spcPct val="0"/>
+              </a:spcBef>
+              <a:spcAft>
+                <a:spcPct val="0"/>
+              </a:spcAft>
+              <a:defRPr>
+                <a:solidFill>
+                  <a:schemeClr val="tx1"/>
+                </a:solidFill>
+                <a:latin typeface="Arial" panose="020B0604020202020204" pitchFamily="34" charset="0"/>
+              </a:defRPr>
+            </a:lvl1pPr>
+            <a:lvl2pPr eaLnBrk="0" fontAlgn="base" hangingPunct="0">
+              <a:spcBef>
+                <a:spcPct val="0"/>
+              </a:spcBef>
+              <a:spcAft>
+                <a:spcPct val="0"/>
+              </a:spcAft>
+              <a:defRPr>
+                <a:solidFill>
+                  <a:schemeClr val="tx1"/>
+                </a:solidFill>
+                <a:latin typeface="Arial" panose="020B0604020202020204" pitchFamily="34" charset="0"/>
+              </a:defRPr>
+            </a:lvl2pPr>
+            <a:lvl3pPr eaLnBrk="0" fontAlgn="base" hangingPunct="0">
+              <a:spcBef>
+                <a:spcPct val="0"/>
+              </a:spcBef>
+              <a:spcAft>
+                <a:spcPct val="0"/>
+              </a:spcAft>
+              <a:defRPr>
+                <a:solidFill>
+                  <a:schemeClr val="tx1"/>
+                </a:solidFill>
+                <a:latin typeface="Arial" panose="020B0604020202020204" pitchFamily="34" charset="0"/>
+              </a:defRPr>
+            </a:lvl3pPr>
+            <a:lvl4pPr eaLnBrk="0" fontAlgn="base" hangingPunct="0">
+              <a:spcBef>
+                <a:spcPct val="0"/>
+              </a:spcBef>
+              <a:spcAft>
+                <a:spcPct val="0"/>
+              </a:spcAft>
+              <a:defRPr>
+                <a:solidFill>
+                  <a:schemeClr val="tx1"/>
+                </a:solidFill>
+                <a:latin typeface="Arial" panose="020B0604020202020204" pitchFamily="34" charset="0"/>
+              </a:defRPr>
+            </a:lvl4pPr>
+            <a:lvl5pPr eaLnBrk="0" fontAlgn="base" hangingPunct="0">
+              <a:spcBef>
+                <a:spcPct val="0"/>
+              </a:spcBef>
+              <a:spcAft>
+                <a:spcPct val="0"/>
+              </a:spcAft>
+              <a:defRPr>
+                <a:solidFill>
+                  <a:schemeClr val="tx1"/>
+                </a:solidFill>
+                <a:latin typeface="Arial" panose="020B0604020202020204" pitchFamily="34" charset="0"/>
+              </a:defRPr>
+            </a:lvl5pPr>
+            <a:lvl6pPr eaLnBrk="0" fontAlgn="base" hangingPunct="0">
+              <a:spcBef>
+                <a:spcPct val="0"/>
+              </a:spcBef>
+              <a:spcAft>
+                <a:spcPct val="0"/>
+              </a:spcAft>
+              <a:defRPr>
+                <a:solidFill>
+                  <a:schemeClr val="tx1"/>
+                </a:solidFill>
+                <a:latin typeface="Arial" panose="020B0604020202020204" pitchFamily="34" charset="0"/>
+              </a:defRPr>
+            </a:lvl6pPr>
+            <a:lvl7pPr eaLnBrk="0" fontAlgn="base" hangingPunct="0">
+              <a:spcBef>
+                <a:spcPct val="0"/>
+              </a:spcBef>
+              <a:spcAft>
+                <a:spcPct val="0"/>
+              </a:spcAft>
+              <a:defRPr>
+                <a:solidFill>
+                  <a:schemeClr val="tx1"/>
+                </a:solidFill>
+                <a:latin typeface="Arial" panose="020B0604020202020204" pitchFamily="34" charset="0"/>
+              </a:defRPr>
+            </a:lvl7pPr>
+            <a:lvl8pPr eaLnBrk="0" fontAlgn="base" hangingPunct="0">
+              <a:spcBef>
+                <a:spcPct val="0"/>
+              </a:spcBef>
+              <a:spcAft>
+                <a:spcPct val="0"/>
+              </a:spcAft>
+              <a:defRPr>
+                <a:solidFill>
+                  <a:schemeClr val="tx1"/>
+                </a:solidFill>
+                <a:latin typeface="Arial" panose="020B0604020202020204" pitchFamily="34" charset="0"/>
+              </a:defRPr>
+            </a:lvl8pPr>
+            <a:lvl9pPr eaLnBrk="0" fontAlgn="base" hangingPunct="0">
+              <a:spcBef>
+                <a:spcPct val="0"/>
+              </a:spcBef>
+              <a:spcAft>
+                <a:spcPct val="0"/>
+              </a:spcAft>
+              <a:defRPr>
+                <a:solidFill>
+                  <a:schemeClr val="tx1"/>
+                </a:solidFill>
+                <a:latin typeface="Arial" panose="020B0604020202020204" pitchFamily="34" charset="0"/>
+              </a:defRPr>
+            </a:lvl9pPr>
+          </a:lstStyle>
+          <a:p>
+            <a:pPr marL="0" marR="0" lvl="0" indent="0" algn="ctr" defTabSz="914400" rtl="0" eaLnBrk="0" fontAlgn="base" latinLnBrk="0" hangingPunct="0">
+              <a:lnSpc>
+                <a:spcPct val="100000"/>
+              </a:lnSpc>
+              <a:spcBef>
+                <a:spcPct val="0"/>
+              </a:spcBef>
+              <a:spcAft>
+                <a:spcPct val="0"/>
+              </a:spcAft>
+              <a:buClrTx/>
+              <a:buSzTx/>
+              <a:buFontTx/>
+              <a:buNone/>
+              <a:tabLst/>
+            </a:pPr>
+            <a:r>
+              <a:rPr lang="en-US" altLang="en-US" sz="3600" b="1" u="sng" dirty="0">
+                <a:solidFill>
+                  <a:schemeClr val="accent1"/>
+                </a:solidFill>
+              </a:rPr>
+              <a:t>Question # 17</a:t>
+            </a:r>
+          </a:p>
+        </p:txBody>
+      </p:sp>
+      <p:sp>
+        <p:nvSpPr>
+          <p:cNvPr id="6" name="Rectangle 2">
+            <a:extLst>
+              <a:ext uri="{FF2B5EF4-FFF2-40B4-BE49-F238E27FC236}">
+                <a16:creationId xmlns:a16="http://schemas.microsoft.com/office/drawing/2014/main" id="{6809B999-1DF9-69DB-1E04-15A7A3C2F00F}"/>
+              </a:ext>
+            </a:extLst>
+          </p:cNvPr>
+          <p:cNvSpPr>
+            <a:spLocks noChangeArrowheads="1"/>
+          </p:cNvSpPr>
+          <p:nvPr/>
+        </p:nvSpPr>
+        <p:spPr bwMode="auto">
+          <a:xfrm rot="10800000" flipV="1">
+            <a:off x="1561670" y="1803964"/>
+            <a:ext cx="8106313" cy="4247317"/>
+          </a:xfrm>
+          <a:prstGeom prst="rect">
+            <a:avLst/>
+          </a:prstGeom>
+          <a:solidFill>
+            <a:srgbClr val="FFFFFF"/>
+          </a:solidFill>
+          <a:ln>
+            <a:noFill/>
+          </a:ln>
+          <a:effectLst/>
+          <a:extLst>
+            <a:ext uri="{91240B29-F687-4F45-9708-019B960494DF}">
+              <a14:hiddenLine xmlns:a14="http://schemas.microsoft.com/office/drawing/2010/main" w="9525">
+                <a:solidFill>
+                  <a:schemeClr val="tx1"/>
+                </a:solidFill>
+                <a:miter lim="800000"/>
+                <a:headEnd/>
+                <a:tailEnd/>
+              </a14:hiddenLine>
+            </a:ext>
+            <a:ext uri="{AF507438-7753-43E0-B8FC-AC1667EBCBE1}">
+              <a14:hiddenEffects xmlns:a14="http://schemas.microsoft.com/office/drawing/2010/main">
+                <a:effectLst>
+                  <a:outerShdw dist="35921" dir="2700000" algn="ctr" rotWithShape="0">
+                    <a:schemeClr val="bg2"/>
+                  </a:outerShdw>
+                </a:effectLst>
+              </a14:hiddenEffects>
+            </a:ext>
+          </a:extLst>
+        </p:spPr>
+        <p:txBody>
+          <a:bodyPr vert="horz" wrap="square" lIns="91440" tIns="45720" rIns="91440" bIns="45720" numCol="1" anchor="ctr" anchorCtr="0" compatLnSpc="1">
+            <a:prstTxWarp prst="textNoShape">
+              <a:avLst/>
+            </a:prstTxWarp>
+            <a:spAutoFit/>
+          </a:bodyPr>
+          <a:lstStyle>
+            <a:lvl1pPr eaLnBrk="0" fontAlgn="base" hangingPunct="0">
+              <a:spcBef>
+                <a:spcPct val="0"/>
+              </a:spcBef>
+              <a:spcAft>
+                <a:spcPct val="0"/>
+              </a:spcAft>
+              <a:defRPr>
+                <a:solidFill>
+                  <a:schemeClr val="tx1"/>
+                </a:solidFill>
+                <a:latin typeface="Arial" panose="020B0604020202020204" pitchFamily="34" charset="0"/>
+              </a:defRPr>
+            </a:lvl1pPr>
+            <a:lvl2pPr eaLnBrk="0" fontAlgn="base" hangingPunct="0">
+              <a:spcBef>
+                <a:spcPct val="0"/>
+              </a:spcBef>
+              <a:spcAft>
+                <a:spcPct val="0"/>
+              </a:spcAft>
+              <a:defRPr>
+                <a:solidFill>
+                  <a:schemeClr val="tx1"/>
+                </a:solidFill>
+                <a:latin typeface="Arial" panose="020B0604020202020204" pitchFamily="34" charset="0"/>
+              </a:defRPr>
+            </a:lvl2pPr>
+            <a:lvl3pPr eaLnBrk="0" fontAlgn="base" hangingPunct="0">
+              <a:spcBef>
+                <a:spcPct val="0"/>
+              </a:spcBef>
+              <a:spcAft>
+                <a:spcPct val="0"/>
+              </a:spcAft>
+              <a:defRPr>
+                <a:solidFill>
+                  <a:schemeClr val="tx1"/>
+                </a:solidFill>
+                <a:latin typeface="Arial" panose="020B0604020202020204" pitchFamily="34" charset="0"/>
+              </a:defRPr>
+            </a:lvl3pPr>
+            <a:lvl4pPr eaLnBrk="0" fontAlgn="base" hangingPunct="0">
+              <a:spcBef>
+                <a:spcPct val="0"/>
+              </a:spcBef>
+              <a:spcAft>
+                <a:spcPct val="0"/>
+              </a:spcAft>
+              <a:defRPr>
+                <a:solidFill>
+                  <a:schemeClr val="tx1"/>
+                </a:solidFill>
+                <a:latin typeface="Arial" panose="020B0604020202020204" pitchFamily="34" charset="0"/>
+              </a:defRPr>
+            </a:lvl4pPr>
+            <a:lvl5pPr eaLnBrk="0" fontAlgn="base" hangingPunct="0">
+              <a:spcBef>
+                <a:spcPct val="0"/>
+              </a:spcBef>
+              <a:spcAft>
+                <a:spcPct val="0"/>
+              </a:spcAft>
+              <a:defRPr>
+                <a:solidFill>
+                  <a:schemeClr val="tx1"/>
+                </a:solidFill>
+                <a:latin typeface="Arial" panose="020B0604020202020204" pitchFamily="34" charset="0"/>
+              </a:defRPr>
+            </a:lvl5pPr>
+            <a:lvl6pPr eaLnBrk="0" fontAlgn="base" hangingPunct="0">
+              <a:spcBef>
+                <a:spcPct val="0"/>
+              </a:spcBef>
+              <a:spcAft>
+                <a:spcPct val="0"/>
+              </a:spcAft>
+              <a:defRPr>
+                <a:solidFill>
+                  <a:schemeClr val="tx1"/>
+                </a:solidFill>
+                <a:latin typeface="Arial" panose="020B0604020202020204" pitchFamily="34" charset="0"/>
+              </a:defRPr>
+            </a:lvl6pPr>
+            <a:lvl7pPr eaLnBrk="0" fontAlgn="base" hangingPunct="0">
+              <a:spcBef>
+                <a:spcPct val="0"/>
+              </a:spcBef>
+              <a:spcAft>
+                <a:spcPct val="0"/>
+              </a:spcAft>
+              <a:defRPr>
+                <a:solidFill>
+                  <a:schemeClr val="tx1"/>
+                </a:solidFill>
+                <a:latin typeface="Arial" panose="020B0604020202020204" pitchFamily="34" charset="0"/>
+              </a:defRPr>
+            </a:lvl7pPr>
+            <a:lvl8pPr eaLnBrk="0" fontAlgn="base" hangingPunct="0">
+              <a:spcBef>
+                <a:spcPct val="0"/>
+              </a:spcBef>
+              <a:spcAft>
+                <a:spcPct val="0"/>
+              </a:spcAft>
+              <a:defRPr>
+                <a:solidFill>
+                  <a:schemeClr val="tx1"/>
+                </a:solidFill>
+                <a:latin typeface="Arial" panose="020B0604020202020204" pitchFamily="34" charset="0"/>
+              </a:defRPr>
+            </a:lvl8pPr>
+            <a:lvl9pPr eaLnBrk="0" fontAlgn="base" hangingPunct="0">
+              <a:spcBef>
+                <a:spcPct val="0"/>
+              </a:spcBef>
+              <a:spcAft>
+                <a:spcPct val="0"/>
+              </a:spcAft>
+              <a:defRPr>
+                <a:solidFill>
+                  <a:schemeClr val="tx1"/>
+                </a:solidFill>
+                <a:latin typeface="Arial" panose="020B0604020202020204" pitchFamily="34" charset="0"/>
+              </a:defRPr>
+            </a:lvl9pPr>
+          </a:lstStyle>
+          <a:p>
+            <a:pPr marL="0" marR="0" lvl="0" indent="0" algn="ctr" defTabSz="914400" rtl="0" eaLnBrk="0" fontAlgn="base" latinLnBrk="0" hangingPunct="0">
+              <a:lnSpc>
+                <a:spcPct val="100000"/>
+              </a:lnSpc>
+              <a:spcBef>
+                <a:spcPct val="0"/>
+              </a:spcBef>
+              <a:spcAft>
+                <a:spcPct val="0"/>
+              </a:spcAft>
+              <a:buClrTx/>
+              <a:buSzTx/>
+              <a:buFontTx/>
+              <a:buNone/>
+              <a:tabLst/>
+            </a:pPr>
+            <a:r>
+              <a:rPr lang="en-US" altLang="en-US" dirty="0"/>
+              <a:t>Ssh into the </a:t>
+            </a:r>
+            <a:r>
+              <a:rPr lang="en-US" altLang="en-US" dirty="0" err="1"/>
+              <a:t>controlplane</a:t>
+            </a:r>
+            <a:r>
+              <a:rPr lang="en-US" altLang="en-US" dirty="0"/>
+              <a:t> node with ssh cluster1-controlplane1. Check how the </a:t>
+            </a:r>
+            <a:r>
+              <a:rPr lang="en-US" altLang="en-US" dirty="0" err="1"/>
+              <a:t>controlplane</a:t>
+            </a:r>
+            <a:r>
+              <a:rPr lang="en-US" altLang="en-US" dirty="0"/>
+              <a:t> components </a:t>
+            </a:r>
+            <a:r>
+              <a:rPr lang="en-US" altLang="en-US" dirty="0" err="1"/>
+              <a:t>kubelet</a:t>
+            </a:r>
+            <a:r>
+              <a:rPr lang="en-US" altLang="en-US" dirty="0"/>
+              <a:t>, </a:t>
+            </a:r>
+            <a:r>
+              <a:rPr lang="en-US" altLang="en-US" dirty="0" err="1"/>
+              <a:t>kube-apiserver</a:t>
+            </a:r>
+            <a:r>
+              <a:rPr lang="en-US" altLang="en-US" dirty="0"/>
+              <a:t>, </a:t>
+            </a:r>
+            <a:r>
+              <a:rPr lang="en-US" altLang="en-US" dirty="0" err="1"/>
+              <a:t>kubescheduler</a:t>
+            </a:r>
+            <a:r>
+              <a:rPr lang="en-US" altLang="en-US" dirty="0"/>
+              <a:t>, </a:t>
+            </a:r>
+            <a:r>
+              <a:rPr lang="en-US" altLang="en-US" dirty="0" err="1"/>
+              <a:t>kube</a:t>
+            </a:r>
+            <a:r>
+              <a:rPr lang="en-US" altLang="en-US" dirty="0"/>
+              <a:t>-controller-manager and </a:t>
+            </a:r>
+            <a:r>
+              <a:rPr lang="en-US" altLang="en-US" dirty="0" err="1"/>
+              <a:t>etcd</a:t>
+            </a:r>
+            <a:r>
+              <a:rPr lang="en-US" altLang="en-US" dirty="0"/>
+              <a:t> are started/installed on the </a:t>
+            </a:r>
+            <a:r>
+              <a:rPr lang="en-US" altLang="en-US" dirty="0" err="1"/>
+              <a:t>controlplane</a:t>
+            </a:r>
+            <a:r>
+              <a:rPr lang="en-US" altLang="en-US" dirty="0"/>
+              <a:t> </a:t>
+            </a:r>
+            <a:r>
+              <a:rPr lang="en-US" altLang="en-US" dirty="0" err="1"/>
+              <a:t>node.Also</a:t>
+            </a:r>
+            <a:r>
+              <a:rPr lang="en-US" altLang="en-US" dirty="0"/>
+              <a:t> find out the name of the DNS application and how its started/installed on the </a:t>
+            </a:r>
+            <a:r>
+              <a:rPr lang="en-US" altLang="en-US" dirty="0" err="1"/>
+              <a:t>controlplane</a:t>
+            </a:r>
+            <a:r>
+              <a:rPr lang="en-US" altLang="en-US" dirty="0"/>
+              <a:t> node.</a:t>
+            </a:r>
+          </a:p>
+          <a:p>
+            <a:pPr marL="0" marR="0" lvl="0" indent="0" algn="ctr" defTabSz="914400" rtl="0" eaLnBrk="0" fontAlgn="base" latinLnBrk="0" hangingPunct="0">
+              <a:lnSpc>
+                <a:spcPct val="100000"/>
+              </a:lnSpc>
+              <a:spcBef>
+                <a:spcPct val="0"/>
+              </a:spcBef>
+              <a:spcAft>
+                <a:spcPct val="0"/>
+              </a:spcAft>
+              <a:buClrTx/>
+              <a:buSzTx/>
+              <a:buFontTx/>
+              <a:buNone/>
+              <a:tabLst/>
+            </a:pPr>
+            <a:r>
+              <a:rPr lang="en-US" altLang="en-US" dirty="0"/>
+              <a:t>Write your findings into the file/opt/course/8/controlplane-components.txt.</a:t>
+            </a:r>
+          </a:p>
+          <a:p>
+            <a:pPr marL="0" marR="0" lvl="0" indent="0" algn="ctr" defTabSz="914400" rtl="0" eaLnBrk="0" fontAlgn="base" latinLnBrk="0" hangingPunct="0">
+              <a:lnSpc>
+                <a:spcPct val="100000"/>
+              </a:lnSpc>
+              <a:spcBef>
+                <a:spcPct val="0"/>
+              </a:spcBef>
+              <a:spcAft>
+                <a:spcPct val="0"/>
+              </a:spcAft>
+              <a:buClrTx/>
+              <a:buSzTx/>
+              <a:buFontTx/>
+              <a:buNone/>
+              <a:tabLst/>
+            </a:pPr>
+            <a:r>
+              <a:rPr lang="en-US" altLang="en-US" dirty="0"/>
+              <a:t>The file should be structured like:</a:t>
+            </a:r>
+          </a:p>
+          <a:p>
+            <a:pPr marL="0" marR="0" lvl="0" indent="0" algn="ctr" defTabSz="914400" rtl="0" eaLnBrk="0" fontAlgn="base" latinLnBrk="0" hangingPunct="0">
+              <a:lnSpc>
+                <a:spcPct val="100000"/>
+              </a:lnSpc>
+              <a:spcBef>
+                <a:spcPct val="0"/>
+              </a:spcBef>
+              <a:spcAft>
+                <a:spcPct val="0"/>
+              </a:spcAft>
+              <a:buClrTx/>
+              <a:buSzTx/>
+              <a:buFontTx/>
+              <a:buNone/>
+              <a:tabLst/>
+            </a:pPr>
+            <a:r>
+              <a:rPr lang="en-US" altLang="en-US" dirty="0"/>
+              <a:t>#/opt/course/8/controlplane-componenets.txt</a:t>
+            </a:r>
+          </a:p>
+          <a:p>
+            <a:pPr lvl="4" algn="just"/>
+            <a:r>
+              <a:rPr lang="en-US" altLang="en-US" dirty="0" err="1"/>
+              <a:t>Kubelet</a:t>
+            </a:r>
+            <a:r>
+              <a:rPr lang="en-US" altLang="en-US" dirty="0"/>
+              <a:t>: [Type]</a:t>
+            </a:r>
+          </a:p>
+          <a:p>
+            <a:pPr lvl="4" algn="just"/>
+            <a:r>
+              <a:rPr lang="en-US" altLang="en-US" dirty="0" err="1"/>
+              <a:t>Kube-apierver</a:t>
+            </a:r>
+            <a:r>
+              <a:rPr lang="en-US" altLang="en-US" dirty="0"/>
+              <a:t>: [Type]</a:t>
+            </a:r>
+          </a:p>
+          <a:p>
+            <a:pPr lvl="4" algn="just"/>
+            <a:r>
+              <a:rPr lang="en-US" altLang="en-US" dirty="0" err="1"/>
+              <a:t>Kube</a:t>
+            </a:r>
+            <a:r>
+              <a:rPr lang="en-US" altLang="en-US" dirty="0"/>
+              <a:t>-scheduler: [Type]</a:t>
+            </a:r>
+          </a:p>
+          <a:p>
+            <a:pPr lvl="4" algn="just"/>
+            <a:r>
+              <a:rPr lang="en-US" altLang="en-US" dirty="0" err="1"/>
+              <a:t>Kube</a:t>
+            </a:r>
+            <a:r>
+              <a:rPr lang="en-US" altLang="en-US" dirty="0"/>
+              <a:t>-controller-manager:[Type]</a:t>
+            </a:r>
+          </a:p>
+          <a:p>
+            <a:pPr lvl="4" algn="just"/>
+            <a:r>
+              <a:rPr lang="en-US" altLang="en-US" dirty="0" err="1"/>
+              <a:t>Etcd</a:t>
+            </a:r>
+            <a:r>
+              <a:rPr lang="en-US" altLang="en-US" dirty="0"/>
+              <a:t>: [Type]</a:t>
+            </a:r>
+          </a:p>
+          <a:p>
+            <a:pPr lvl="4" algn="just"/>
+            <a:r>
+              <a:rPr lang="en-US" altLang="en-US" dirty="0" err="1"/>
+              <a:t>Dns</a:t>
+            </a:r>
+            <a:r>
+              <a:rPr lang="en-US" altLang="en-US" dirty="0"/>
+              <a:t>: [Type] [Name]</a:t>
+            </a:r>
+          </a:p>
+          <a:p>
+            <a:pPr marL="0" marR="0" lvl="0" indent="0" algn="ctr" defTabSz="914400" rtl="0" eaLnBrk="0" fontAlgn="base" latinLnBrk="0" hangingPunct="0">
+              <a:lnSpc>
+                <a:spcPct val="100000"/>
+              </a:lnSpc>
+              <a:spcBef>
+                <a:spcPct val="0"/>
+              </a:spcBef>
+              <a:spcAft>
+                <a:spcPct val="0"/>
+              </a:spcAft>
+              <a:buClrTx/>
+              <a:buSzTx/>
+              <a:buFontTx/>
+              <a:buNone/>
+              <a:tabLst/>
+            </a:pPr>
+            <a:r>
+              <a:rPr lang="en-US" altLang="en-US" dirty="0"/>
+              <a:t>Choices of [Type] are: are-not </a:t>
+            </a:r>
+            <a:r>
+              <a:rPr lang="en-US" altLang="en-US" dirty="0" err="1"/>
+              <a:t>installed,process,static-pod,pod</a:t>
+            </a:r>
+            <a:endParaRPr lang="en-US" altLang="en-US" dirty="0"/>
+          </a:p>
+        </p:txBody>
+      </p:sp>
+    </p:spTree>
+    <p:extLst>
+      <p:ext uri="{BB962C8B-B14F-4D97-AF65-F5344CB8AC3E}">
+        <p14:creationId xmlns:p14="http://schemas.microsoft.com/office/powerpoint/2010/main" val="3674507804"/>
+      </p:ext>
+    </p:extLst>
+  </p:cSld>
+  <p:clrMapOvr>
+    <a:masterClrMapping/>
+  </p:clrMapOvr>
+</p:sld>
+</file>
+
+<file path=ppt/slides/slide18.xml><?xml version="1.0" encoding="utf-8"?>
+<p:sld xmlns:a="http://schemas.openxmlformats.org/drawingml/2006/main" xmlns:r="http://schemas.openxmlformats.org/officeDocument/2006/relationships" xmlns:p="http://schemas.openxmlformats.org/presentationml/2006/main">
+  <p:cSld>
+    <p:spTree>
+      <p:nvGrpSpPr>
+        <p:cNvPr id="1" name=""/>
+        <p:cNvGrpSpPr/>
+        <p:nvPr/>
+      </p:nvGrpSpPr>
+      <p:grpSpPr>
+        <a:xfrm>
+          <a:off x="0" y="0"/>
+          <a:ext cx="0" cy="0"/>
+          <a:chOff x="0" y="0"/>
+          <a:chExt cx="0" cy="0"/>
+        </a:xfrm>
+      </p:grpSpPr>
+      <p:sp>
+        <p:nvSpPr>
+          <p:cNvPr id="5" name="Rectangle 2">
+            <a:extLst>
+              <a:ext uri="{FF2B5EF4-FFF2-40B4-BE49-F238E27FC236}">
+                <a16:creationId xmlns:a16="http://schemas.microsoft.com/office/drawing/2014/main" id="{F178CF33-752E-0E50-F24B-A2AF2687EBBE}"/>
+              </a:ext>
+            </a:extLst>
+          </p:cNvPr>
+          <p:cNvSpPr>
+            <a:spLocks noChangeArrowheads="1"/>
+          </p:cNvSpPr>
+          <p:nvPr/>
+        </p:nvSpPr>
+        <p:spPr bwMode="auto">
+          <a:xfrm rot="10800000" flipV="1">
+            <a:off x="3380198" y="991928"/>
+            <a:ext cx="3996647" cy="646331"/>
+          </a:xfrm>
+          <a:prstGeom prst="rect">
+            <a:avLst/>
+          </a:prstGeom>
+          <a:solidFill>
+            <a:srgbClr val="FFFFFF"/>
+          </a:solidFill>
+          <a:ln>
+            <a:noFill/>
+          </a:ln>
+          <a:effectLst/>
+          <a:extLst>
+            <a:ext uri="{91240B29-F687-4F45-9708-019B960494DF}">
+              <a14:hiddenLine xmlns:a14="http://schemas.microsoft.com/office/drawing/2010/main" w="9525">
+                <a:solidFill>
+                  <a:schemeClr val="tx1"/>
+                </a:solidFill>
+                <a:miter lim="800000"/>
+                <a:headEnd/>
+                <a:tailEnd/>
+              </a14:hiddenLine>
+            </a:ext>
+            <a:ext uri="{AF507438-7753-43E0-B8FC-AC1667EBCBE1}">
+              <a14:hiddenEffects xmlns:a14="http://schemas.microsoft.com/office/drawing/2010/main">
+                <a:effectLst>
+                  <a:outerShdw dist="35921" dir="2700000" algn="ctr" rotWithShape="0">
+                    <a:schemeClr val="bg2"/>
+                  </a:outerShdw>
+                </a:effectLst>
+              </a14:hiddenEffects>
+            </a:ext>
+          </a:extLst>
+        </p:spPr>
+        <p:txBody>
+          <a:bodyPr vert="horz" wrap="square" lIns="91440" tIns="45720" rIns="91440" bIns="45720" numCol="1" anchor="ctr" anchorCtr="0" compatLnSpc="1">
+            <a:prstTxWarp prst="textNoShape">
+              <a:avLst/>
+            </a:prstTxWarp>
+            <a:spAutoFit/>
+          </a:bodyPr>
+          <a:lstStyle>
+            <a:lvl1pPr eaLnBrk="0" fontAlgn="base" hangingPunct="0">
+              <a:spcBef>
+                <a:spcPct val="0"/>
+              </a:spcBef>
+              <a:spcAft>
+                <a:spcPct val="0"/>
+              </a:spcAft>
+              <a:defRPr>
+                <a:solidFill>
+                  <a:schemeClr val="tx1"/>
+                </a:solidFill>
+                <a:latin typeface="Arial" panose="020B0604020202020204" pitchFamily="34" charset="0"/>
+              </a:defRPr>
+            </a:lvl1pPr>
+            <a:lvl2pPr eaLnBrk="0" fontAlgn="base" hangingPunct="0">
+              <a:spcBef>
+                <a:spcPct val="0"/>
+              </a:spcBef>
+              <a:spcAft>
+                <a:spcPct val="0"/>
+              </a:spcAft>
+              <a:defRPr>
+                <a:solidFill>
+                  <a:schemeClr val="tx1"/>
+                </a:solidFill>
+                <a:latin typeface="Arial" panose="020B0604020202020204" pitchFamily="34" charset="0"/>
+              </a:defRPr>
+            </a:lvl2pPr>
+            <a:lvl3pPr eaLnBrk="0" fontAlgn="base" hangingPunct="0">
+              <a:spcBef>
+                <a:spcPct val="0"/>
+              </a:spcBef>
+              <a:spcAft>
+                <a:spcPct val="0"/>
+              </a:spcAft>
+              <a:defRPr>
+                <a:solidFill>
+                  <a:schemeClr val="tx1"/>
+                </a:solidFill>
+                <a:latin typeface="Arial" panose="020B0604020202020204" pitchFamily="34" charset="0"/>
+              </a:defRPr>
+            </a:lvl3pPr>
+            <a:lvl4pPr eaLnBrk="0" fontAlgn="base" hangingPunct="0">
+              <a:spcBef>
+                <a:spcPct val="0"/>
+              </a:spcBef>
+              <a:spcAft>
+                <a:spcPct val="0"/>
+              </a:spcAft>
+              <a:defRPr>
+                <a:solidFill>
+                  <a:schemeClr val="tx1"/>
+                </a:solidFill>
+                <a:latin typeface="Arial" panose="020B0604020202020204" pitchFamily="34" charset="0"/>
+              </a:defRPr>
+            </a:lvl4pPr>
+            <a:lvl5pPr eaLnBrk="0" fontAlgn="base" hangingPunct="0">
+              <a:spcBef>
+                <a:spcPct val="0"/>
+              </a:spcBef>
+              <a:spcAft>
+                <a:spcPct val="0"/>
+              </a:spcAft>
+              <a:defRPr>
+                <a:solidFill>
+                  <a:schemeClr val="tx1"/>
+                </a:solidFill>
+                <a:latin typeface="Arial" panose="020B0604020202020204" pitchFamily="34" charset="0"/>
+              </a:defRPr>
+            </a:lvl5pPr>
+            <a:lvl6pPr eaLnBrk="0" fontAlgn="base" hangingPunct="0">
+              <a:spcBef>
+                <a:spcPct val="0"/>
+              </a:spcBef>
+              <a:spcAft>
+                <a:spcPct val="0"/>
+              </a:spcAft>
+              <a:defRPr>
+                <a:solidFill>
+                  <a:schemeClr val="tx1"/>
+                </a:solidFill>
+                <a:latin typeface="Arial" panose="020B0604020202020204" pitchFamily="34" charset="0"/>
+              </a:defRPr>
+            </a:lvl6pPr>
+            <a:lvl7pPr eaLnBrk="0" fontAlgn="base" hangingPunct="0">
+              <a:spcBef>
+                <a:spcPct val="0"/>
+              </a:spcBef>
+              <a:spcAft>
+                <a:spcPct val="0"/>
+              </a:spcAft>
+              <a:defRPr>
+                <a:solidFill>
+                  <a:schemeClr val="tx1"/>
+                </a:solidFill>
+                <a:latin typeface="Arial" panose="020B0604020202020204" pitchFamily="34" charset="0"/>
+              </a:defRPr>
+            </a:lvl7pPr>
+            <a:lvl8pPr eaLnBrk="0" fontAlgn="base" hangingPunct="0">
+              <a:spcBef>
+                <a:spcPct val="0"/>
+              </a:spcBef>
+              <a:spcAft>
+                <a:spcPct val="0"/>
+              </a:spcAft>
+              <a:defRPr>
+                <a:solidFill>
+                  <a:schemeClr val="tx1"/>
+                </a:solidFill>
+                <a:latin typeface="Arial" panose="020B0604020202020204" pitchFamily="34" charset="0"/>
+              </a:defRPr>
+            </a:lvl8pPr>
+            <a:lvl9pPr eaLnBrk="0" fontAlgn="base" hangingPunct="0">
+              <a:spcBef>
+                <a:spcPct val="0"/>
+              </a:spcBef>
+              <a:spcAft>
+                <a:spcPct val="0"/>
+              </a:spcAft>
+              <a:defRPr>
+                <a:solidFill>
+                  <a:schemeClr val="tx1"/>
+                </a:solidFill>
+                <a:latin typeface="Arial" panose="020B0604020202020204" pitchFamily="34" charset="0"/>
+              </a:defRPr>
+            </a:lvl9pPr>
+          </a:lstStyle>
+          <a:p>
+            <a:pPr marL="0" marR="0" lvl="0" indent="0" algn="ctr" defTabSz="914400" rtl="0" eaLnBrk="0" fontAlgn="base" latinLnBrk="0" hangingPunct="0">
+              <a:lnSpc>
+                <a:spcPct val="100000"/>
+              </a:lnSpc>
+              <a:spcBef>
+                <a:spcPct val="0"/>
+              </a:spcBef>
+              <a:spcAft>
+                <a:spcPct val="0"/>
+              </a:spcAft>
+              <a:buClrTx/>
+              <a:buSzTx/>
+              <a:buFontTx/>
+              <a:buNone/>
+              <a:tabLst/>
+            </a:pPr>
+            <a:r>
+              <a:rPr lang="en-US" altLang="en-US" sz="3600" b="1" u="sng" dirty="0">
+                <a:solidFill>
+                  <a:schemeClr val="accent1"/>
+                </a:solidFill>
+              </a:rPr>
+              <a:t>Question # 18</a:t>
+            </a:r>
+          </a:p>
+        </p:txBody>
+      </p:sp>
+      <p:sp>
+        <p:nvSpPr>
+          <p:cNvPr id="6" name="Rectangle 2">
+            <a:extLst>
+              <a:ext uri="{FF2B5EF4-FFF2-40B4-BE49-F238E27FC236}">
+                <a16:creationId xmlns:a16="http://schemas.microsoft.com/office/drawing/2014/main" id="{6809B999-1DF9-69DB-1E04-15A7A3C2F00F}"/>
+              </a:ext>
+            </a:extLst>
+          </p:cNvPr>
+          <p:cNvSpPr>
+            <a:spLocks noChangeArrowheads="1"/>
+          </p:cNvSpPr>
+          <p:nvPr/>
+        </p:nvSpPr>
+        <p:spPr bwMode="auto">
+          <a:xfrm rot="10800000" flipV="1">
+            <a:off x="1541121" y="2151728"/>
+            <a:ext cx="8106313" cy="2554545"/>
+          </a:xfrm>
+          <a:prstGeom prst="rect">
+            <a:avLst/>
+          </a:prstGeom>
+          <a:solidFill>
+            <a:srgbClr val="FFFFFF"/>
+          </a:solidFill>
+          <a:ln>
+            <a:noFill/>
+          </a:ln>
+          <a:effectLst/>
+          <a:extLst>
+            <a:ext uri="{91240B29-F687-4F45-9708-019B960494DF}">
+              <a14:hiddenLine xmlns:a14="http://schemas.microsoft.com/office/drawing/2010/main" w="9525">
+                <a:solidFill>
+                  <a:schemeClr val="tx1"/>
+                </a:solidFill>
+                <a:miter lim="800000"/>
+                <a:headEnd/>
+                <a:tailEnd/>
+              </a14:hiddenLine>
+            </a:ext>
+            <a:ext uri="{AF507438-7753-43E0-B8FC-AC1667EBCBE1}">
+              <a14:hiddenEffects xmlns:a14="http://schemas.microsoft.com/office/drawing/2010/main">
+                <a:effectLst>
+                  <a:outerShdw dist="35921" dir="2700000" algn="ctr" rotWithShape="0">
+                    <a:schemeClr val="bg2"/>
+                  </a:outerShdw>
+                </a:effectLst>
+              </a14:hiddenEffects>
+            </a:ext>
+          </a:extLst>
+        </p:spPr>
+        <p:txBody>
+          <a:bodyPr vert="horz" wrap="square" lIns="91440" tIns="45720" rIns="91440" bIns="45720" numCol="1" anchor="ctr" anchorCtr="0" compatLnSpc="1">
+            <a:prstTxWarp prst="textNoShape">
+              <a:avLst/>
+            </a:prstTxWarp>
+            <a:spAutoFit/>
+          </a:bodyPr>
+          <a:lstStyle>
+            <a:lvl1pPr eaLnBrk="0" fontAlgn="base" hangingPunct="0">
+              <a:spcBef>
+                <a:spcPct val="0"/>
+              </a:spcBef>
+              <a:spcAft>
+                <a:spcPct val="0"/>
+              </a:spcAft>
+              <a:defRPr>
+                <a:solidFill>
+                  <a:schemeClr val="tx1"/>
+                </a:solidFill>
+                <a:latin typeface="Arial" panose="020B0604020202020204" pitchFamily="34" charset="0"/>
+              </a:defRPr>
+            </a:lvl1pPr>
+            <a:lvl2pPr eaLnBrk="0" fontAlgn="base" hangingPunct="0">
+              <a:spcBef>
+                <a:spcPct val="0"/>
+              </a:spcBef>
+              <a:spcAft>
+                <a:spcPct val="0"/>
+              </a:spcAft>
+              <a:defRPr>
+                <a:solidFill>
+                  <a:schemeClr val="tx1"/>
+                </a:solidFill>
+                <a:latin typeface="Arial" panose="020B0604020202020204" pitchFamily="34" charset="0"/>
+              </a:defRPr>
+            </a:lvl2pPr>
+            <a:lvl3pPr eaLnBrk="0" fontAlgn="base" hangingPunct="0">
+              <a:spcBef>
+                <a:spcPct val="0"/>
+              </a:spcBef>
+              <a:spcAft>
+                <a:spcPct val="0"/>
+              </a:spcAft>
+              <a:defRPr>
+                <a:solidFill>
+                  <a:schemeClr val="tx1"/>
+                </a:solidFill>
+                <a:latin typeface="Arial" panose="020B0604020202020204" pitchFamily="34" charset="0"/>
+              </a:defRPr>
+            </a:lvl3pPr>
+            <a:lvl4pPr eaLnBrk="0" fontAlgn="base" hangingPunct="0">
+              <a:spcBef>
+                <a:spcPct val="0"/>
+              </a:spcBef>
+              <a:spcAft>
+                <a:spcPct val="0"/>
+              </a:spcAft>
+              <a:defRPr>
+                <a:solidFill>
+                  <a:schemeClr val="tx1"/>
+                </a:solidFill>
+                <a:latin typeface="Arial" panose="020B0604020202020204" pitchFamily="34" charset="0"/>
+              </a:defRPr>
+            </a:lvl4pPr>
+            <a:lvl5pPr eaLnBrk="0" fontAlgn="base" hangingPunct="0">
+              <a:spcBef>
+                <a:spcPct val="0"/>
+              </a:spcBef>
+              <a:spcAft>
+                <a:spcPct val="0"/>
+              </a:spcAft>
+              <a:defRPr>
+                <a:solidFill>
+                  <a:schemeClr val="tx1"/>
+                </a:solidFill>
+                <a:latin typeface="Arial" panose="020B0604020202020204" pitchFamily="34" charset="0"/>
+              </a:defRPr>
+            </a:lvl5pPr>
+            <a:lvl6pPr eaLnBrk="0" fontAlgn="base" hangingPunct="0">
+              <a:spcBef>
+                <a:spcPct val="0"/>
+              </a:spcBef>
+              <a:spcAft>
+                <a:spcPct val="0"/>
+              </a:spcAft>
+              <a:defRPr>
+                <a:solidFill>
+                  <a:schemeClr val="tx1"/>
+                </a:solidFill>
+                <a:latin typeface="Arial" panose="020B0604020202020204" pitchFamily="34" charset="0"/>
+              </a:defRPr>
+            </a:lvl6pPr>
+            <a:lvl7pPr eaLnBrk="0" fontAlgn="base" hangingPunct="0">
+              <a:spcBef>
+                <a:spcPct val="0"/>
+              </a:spcBef>
+              <a:spcAft>
+                <a:spcPct val="0"/>
+              </a:spcAft>
+              <a:defRPr>
+                <a:solidFill>
+                  <a:schemeClr val="tx1"/>
+                </a:solidFill>
+                <a:latin typeface="Arial" panose="020B0604020202020204" pitchFamily="34" charset="0"/>
+              </a:defRPr>
+            </a:lvl7pPr>
+            <a:lvl8pPr eaLnBrk="0" fontAlgn="base" hangingPunct="0">
+              <a:spcBef>
+                <a:spcPct val="0"/>
+              </a:spcBef>
+              <a:spcAft>
+                <a:spcPct val="0"/>
+              </a:spcAft>
+              <a:defRPr>
+                <a:solidFill>
+                  <a:schemeClr val="tx1"/>
+                </a:solidFill>
+                <a:latin typeface="Arial" panose="020B0604020202020204" pitchFamily="34" charset="0"/>
+              </a:defRPr>
+            </a:lvl8pPr>
+            <a:lvl9pPr eaLnBrk="0" fontAlgn="base" hangingPunct="0">
+              <a:spcBef>
+                <a:spcPct val="0"/>
+              </a:spcBef>
+              <a:spcAft>
+                <a:spcPct val="0"/>
+              </a:spcAft>
+              <a:defRPr>
+                <a:solidFill>
+                  <a:schemeClr val="tx1"/>
+                </a:solidFill>
+                <a:latin typeface="Arial" panose="020B0604020202020204" pitchFamily="34" charset="0"/>
+              </a:defRPr>
+            </a:lvl9pPr>
+          </a:lstStyle>
+          <a:p>
+            <a:pPr marL="342900" indent="-342900" algn="ctr">
+              <a:buFont typeface="Arial" panose="020B0604020202020204" pitchFamily="34" charset="0"/>
+              <a:buChar char="•"/>
+            </a:pPr>
+            <a:r>
+              <a:rPr lang="en-US" altLang="en-US" sz="2000" dirty="0"/>
+              <a:t>Create a namespace named </a:t>
+            </a:r>
+            <a:r>
+              <a:rPr lang="en-US" altLang="en-US" sz="2000" dirty="0" err="1"/>
+              <a:t>appychip</a:t>
+            </a:r>
+            <a:r>
+              <a:rPr lang="en-US" altLang="en-US" sz="2000" dirty="0"/>
+              <a:t>.</a:t>
+            </a:r>
+          </a:p>
+          <a:p>
+            <a:pPr marL="342900" marR="0" lvl="0" indent="-342900" algn="ctr" defTabSz="914400" rtl="0" eaLnBrk="0" fontAlgn="base" latinLnBrk="0" hangingPunct="0">
+              <a:lnSpc>
+                <a:spcPct val="100000"/>
+              </a:lnSpc>
+              <a:spcBef>
+                <a:spcPct val="0"/>
+              </a:spcBef>
+              <a:spcAft>
+                <a:spcPct val="0"/>
+              </a:spcAft>
+              <a:buClrTx/>
+              <a:buSzTx/>
+              <a:buFont typeface="Arial" panose="020B0604020202020204" pitchFamily="34" charset="0"/>
+              <a:buChar char="•"/>
+              <a:tabLst/>
+            </a:pPr>
+            <a:r>
+              <a:rPr lang="en-US" altLang="en-US" sz="2000" dirty="0"/>
+              <a:t>Create a new network policy named my-policy in the </a:t>
+            </a:r>
+            <a:r>
+              <a:rPr lang="en-US" altLang="en-US" sz="2000" dirty="0" err="1"/>
+              <a:t>appychip</a:t>
+            </a:r>
+            <a:r>
+              <a:rPr lang="en-US" altLang="en-US" sz="2000" dirty="0"/>
+              <a:t> namespace.</a:t>
+            </a:r>
+          </a:p>
+          <a:p>
+            <a:pPr marL="0" marR="0" lvl="0" indent="0" algn="ctr" defTabSz="914400" rtl="0" eaLnBrk="0" fontAlgn="base" latinLnBrk="0" hangingPunct="0">
+              <a:lnSpc>
+                <a:spcPct val="100000"/>
+              </a:lnSpc>
+              <a:spcBef>
+                <a:spcPct val="0"/>
+              </a:spcBef>
+              <a:spcAft>
+                <a:spcPct val="0"/>
+              </a:spcAft>
+              <a:buClrTx/>
+              <a:buSzTx/>
+              <a:buFontTx/>
+              <a:buNone/>
+              <a:tabLst/>
+            </a:pPr>
+            <a:r>
+              <a:rPr lang="en-US" altLang="en-US" sz="2000" b="1" dirty="0"/>
+              <a:t>Requirements</a:t>
+            </a:r>
+            <a:r>
+              <a:rPr lang="en-US" altLang="en-US" sz="2000" dirty="0"/>
+              <a:t>:</a:t>
+            </a:r>
+          </a:p>
+          <a:p>
+            <a:pPr marL="0" marR="0" lvl="0" indent="0" algn="ctr" defTabSz="914400" rtl="0" eaLnBrk="0" fontAlgn="base" latinLnBrk="0" hangingPunct="0">
+              <a:lnSpc>
+                <a:spcPct val="100000"/>
+              </a:lnSpc>
+              <a:spcBef>
+                <a:spcPct val="0"/>
+              </a:spcBef>
+              <a:spcAft>
+                <a:spcPct val="0"/>
+              </a:spcAft>
+              <a:buClrTx/>
+              <a:buSzTx/>
+              <a:buFontTx/>
+              <a:buNone/>
+              <a:tabLst/>
+            </a:pPr>
+            <a:r>
+              <a:rPr lang="en-US" altLang="en-US" sz="2000" dirty="0"/>
+              <a:t>1.Network policy should allow PODS within the </a:t>
+            </a:r>
+            <a:r>
+              <a:rPr lang="en-US" altLang="en-US" sz="2000" dirty="0" err="1"/>
+              <a:t>appychip</a:t>
+            </a:r>
+            <a:r>
+              <a:rPr lang="en-US" altLang="en-US" sz="2000" dirty="0"/>
+              <a:t> to connect to each other only on port 80. no other ports should be allowed.</a:t>
+            </a:r>
+          </a:p>
+          <a:p>
+            <a:pPr marL="0" marR="0" lvl="0" indent="0" algn="ctr" defTabSz="914400" rtl="0" eaLnBrk="0" fontAlgn="base" latinLnBrk="0" hangingPunct="0">
+              <a:lnSpc>
+                <a:spcPct val="100000"/>
+              </a:lnSpc>
+              <a:spcBef>
+                <a:spcPct val="0"/>
+              </a:spcBef>
+              <a:spcAft>
+                <a:spcPct val="0"/>
+              </a:spcAft>
+              <a:buClrTx/>
+              <a:buSzTx/>
+              <a:buFontTx/>
+              <a:buNone/>
+              <a:tabLst/>
+            </a:pPr>
+            <a:r>
+              <a:rPr lang="en-US" altLang="en-US" sz="2000" dirty="0"/>
+              <a:t>2.No PODS from outside of the </a:t>
+            </a:r>
+            <a:r>
+              <a:rPr lang="en-US" altLang="en-US" sz="2000" dirty="0" err="1"/>
+              <a:t>appychip</a:t>
+            </a:r>
+            <a:r>
+              <a:rPr lang="en-US" altLang="en-US" sz="2000" dirty="0"/>
+              <a:t> should be able to connect to any pods inside the </a:t>
+            </a:r>
+            <a:r>
+              <a:rPr lang="en-US" altLang="en-US" sz="2000" dirty="0" err="1"/>
+              <a:t>appychip</a:t>
+            </a:r>
+            <a:endParaRPr lang="en-US" altLang="en-US" sz="2000" dirty="0"/>
+          </a:p>
+        </p:txBody>
+      </p:sp>
+    </p:spTree>
+    <p:extLst>
+      <p:ext uri="{BB962C8B-B14F-4D97-AF65-F5344CB8AC3E}">
+        <p14:creationId xmlns:p14="http://schemas.microsoft.com/office/powerpoint/2010/main" val="1768323480"/>
+      </p:ext>
+    </p:extLst>
+  </p:cSld>
+  <p:clrMapOvr>
+    <a:masterClrMapping/>
+  </p:clrMapOvr>
+</p:sld>
+</file>
+
+<file path=ppt/slides/slide19.xml><?xml version="1.0" encoding="utf-8"?>
+<p:sld xmlns:a="http://schemas.openxmlformats.org/drawingml/2006/main" xmlns:r="http://schemas.openxmlformats.org/officeDocument/2006/relationships" xmlns:p="http://schemas.openxmlformats.org/presentationml/2006/main">
+  <p:cSld>
+    <p:spTree>
+      <p:nvGrpSpPr>
+        <p:cNvPr id="1" name=""/>
+        <p:cNvGrpSpPr/>
+        <p:nvPr/>
+      </p:nvGrpSpPr>
+      <p:grpSpPr>
+        <a:xfrm>
+          <a:off x="0" y="0"/>
+          <a:ext cx="0" cy="0"/>
+          <a:chOff x="0" y="0"/>
+          <a:chExt cx="0" cy="0"/>
+        </a:xfrm>
+      </p:grpSpPr>
+      <p:sp>
+        <p:nvSpPr>
+          <p:cNvPr id="5" name="Rectangle 2">
+            <a:extLst>
+              <a:ext uri="{FF2B5EF4-FFF2-40B4-BE49-F238E27FC236}">
+                <a16:creationId xmlns:a16="http://schemas.microsoft.com/office/drawing/2014/main" id="{F178CF33-752E-0E50-F24B-A2AF2687EBBE}"/>
+              </a:ext>
+            </a:extLst>
+          </p:cNvPr>
+          <p:cNvSpPr>
+            <a:spLocks noChangeArrowheads="1"/>
+          </p:cNvSpPr>
+          <p:nvPr/>
+        </p:nvSpPr>
+        <p:spPr bwMode="auto">
+          <a:xfrm rot="10800000" flipV="1">
+            <a:off x="3431569" y="231640"/>
+            <a:ext cx="3996647" cy="646331"/>
+          </a:xfrm>
+          <a:prstGeom prst="rect">
+            <a:avLst/>
+          </a:prstGeom>
+          <a:solidFill>
+            <a:srgbClr val="FFFFFF"/>
+          </a:solidFill>
+          <a:ln>
+            <a:noFill/>
+          </a:ln>
+          <a:effectLst/>
+          <a:extLst>
+            <a:ext uri="{91240B29-F687-4F45-9708-019B960494DF}">
+              <a14:hiddenLine xmlns:a14="http://schemas.microsoft.com/office/drawing/2010/main" w="9525">
+                <a:solidFill>
+                  <a:schemeClr val="tx1"/>
+                </a:solidFill>
+                <a:miter lim="800000"/>
+                <a:headEnd/>
+                <a:tailEnd/>
+              </a14:hiddenLine>
+            </a:ext>
+            <a:ext uri="{AF507438-7753-43E0-B8FC-AC1667EBCBE1}">
+              <a14:hiddenEffects xmlns:a14="http://schemas.microsoft.com/office/drawing/2010/main">
+                <a:effectLst>
+                  <a:outerShdw dist="35921" dir="2700000" algn="ctr" rotWithShape="0">
+                    <a:schemeClr val="bg2"/>
+                  </a:outerShdw>
+                </a:effectLst>
+              </a14:hiddenEffects>
+            </a:ext>
+          </a:extLst>
+        </p:spPr>
+        <p:txBody>
+          <a:bodyPr vert="horz" wrap="square" lIns="91440" tIns="45720" rIns="91440" bIns="45720" numCol="1" anchor="ctr" anchorCtr="0" compatLnSpc="1">
+            <a:prstTxWarp prst="textNoShape">
+              <a:avLst/>
+            </a:prstTxWarp>
+            <a:spAutoFit/>
+          </a:bodyPr>
+          <a:lstStyle>
+            <a:lvl1pPr eaLnBrk="0" fontAlgn="base" hangingPunct="0">
+              <a:spcBef>
+                <a:spcPct val="0"/>
+              </a:spcBef>
+              <a:spcAft>
+                <a:spcPct val="0"/>
+              </a:spcAft>
+              <a:defRPr>
+                <a:solidFill>
+                  <a:schemeClr val="tx1"/>
+                </a:solidFill>
+                <a:latin typeface="Arial" panose="020B0604020202020204" pitchFamily="34" charset="0"/>
+              </a:defRPr>
+            </a:lvl1pPr>
+            <a:lvl2pPr eaLnBrk="0" fontAlgn="base" hangingPunct="0">
+              <a:spcBef>
+                <a:spcPct val="0"/>
+              </a:spcBef>
+              <a:spcAft>
+                <a:spcPct val="0"/>
+              </a:spcAft>
+              <a:defRPr>
+                <a:solidFill>
+                  <a:schemeClr val="tx1"/>
+                </a:solidFill>
+                <a:latin typeface="Arial" panose="020B0604020202020204" pitchFamily="34" charset="0"/>
+              </a:defRPr>
+            </a:lvl2pPr>
+            <a:lvl3pPr eaLnBrk="0" fontAlgn="base" hangingPunct="0">
+              <a:spcBef>
+                <a:spcPct val="0"/>
+              </a:spcBef>
+              <a:spcAft>
+                <a:spcPct val="0"/>
+              </a:spcAft>
+              <a:defRPr>
+                <a:solidFill>
+                  <a:schemeClr val="tx1"/>
+                </a:solidFill>
+                <a:latin typeface="Arial" panose="020B0604020202020204" pitchFamily="34" charset="0"/>
+              </a:defRPr>
+            </a:lvl3pPr>
+            <a:lvl4pPr eaLnBrk="0" fontAlgn="base" hangingPunct="0">
+              <a:spcBef>
+                <a:spcPct val="0"/>
+              </a:spcBef>
+              <a:spcAft>
+                <a:spcPct val="0"/>
+              </a:spcAft>
+              <a:defRPr>
+                <a:solidFill>
+                  <a:schemeClr val="tx1"/>
+                </a:solidFill>
+                <a:latin typeface="Arial" panose="020B0604020202020204" pitchFamily="34" charset="0"/>
+              </a:defRPr>
+            </a:lvl4pPr>
+            <a:lvl5pPr eaLnBrk="0" fontAlgn="base" hangingPunct="0">
+              <a:spcBef>
+                <a:spcPct val="0"/>
+              </a:spcBef>
+              <a:spcAft>
+                <a:spcPct val="0"/>
+              </a:spcAft>
+              <a:defRPr>
+                <a:solidFill>
+                  <a:schemeClr val="tx1"/>
+                </a:solidFill>
+                <a:latin typeface="Arial" panose="020B0604020202020204" pitchFamily="34" charset="0"/>
+              </a:defRPr>
+            </a:lvl5pPr>
+            <a:lvl6pPr eaLnBrk="0" fontAlgn="base" hangingPunct="0">
+              <a:spcBef>
+                <a:spcPct val="0"/>
+              </a:spcBef>
+              <a:spcAft>
+                <a:spcPct val="0"/>
+              </a:spcAft>
+              <a:defRPr>
+                <a:solidFill>
+                  <a:schemeClr val="tx1"/>
+                </a:solidFill>
+                <a:latin typeface="Arial" panose="020B0604020202020204" pitchFamily="34" charset="0"/>
+              </a:defRPr>
+            </a:lvl6pPr>
+            <a:lvl7pPr eaLnBrk="0" fontAlgn="base" hangingPunct="0">
+              <a:spcBef>
+                <a:spcPct val="0"/>
+              </a:spcBef>
+              <a:spcAft>
+                <a:spcPct val="0"/>
+              </a:spcAft>
+              <a:defRPr>
+                <a:solidFill>
+                  <a:schemeClr val="tx1"/>
+                </a:solidFill>
+                <a:latin typeface="Arial" panose="020B0604020202020204" pitchFamily="34" charset="0"/>
+              </a:defRPr>
+            </a:lvl7pPr>
+            <a:lvl8pPr eaLnBrk="0" fontAlgn="base" hangingPunct="0">
+              <a:spcBef>
+                <a:spcPct val="0"/>
+              </a:spcBef>
+              <a:spcAft>
+                <a:spcPct val="0"/>
+              </a:spcAft>
+              <a:defRPr>
+                <a:solidFill>
+                  <a:schemeClr val="tx1"/>
+                </a:solidFill>
+                <a:latin typeface="Arial" panose="020B0604020202020204" pitchFamily="34" charset="0"/>
+              </a:defRPr>
+            </a:lvl8pPr>
+            <a:lvl9pPr eaLnBrk="0" fontAlgn="base" hangingPunct="0">
+              <a:spcBef>
+                <a:spcPct val="0"/>
+              </a:spcBef>
+              <a:spcAft>
+                <a:spcPct val="0"/>
+              </a:spcAft>
+              <a:defRPr>
+                <a:solidFill>
+                  <a:schemeClr val="tx1"/>
+                </a:solidFill>
+                <a:latin typeface="Arial" panose="020B0604020202020204" pitchFamily="34" charset="0"/>
+              </a:defRPr>
+            </a:lvl9pPr>
+          </a:lstStyle>
+          <a:p>
+            <a:pPr marL="0" marR="0" lvl="0" indent="0" algn="ctr" defTabSz="914400" rtl="0" eaLnBrk="0" fontAlgn="base" latinLnBrk="0" hangingPunct="0">
+              <a:lnSpc>
+                <a:spcPct val="100000"/>
+              </a:lnSpc>
+              <a:spcBef>
+                <a:spcPct val="0"/>
+              </a:spcBef>
+              <a:spcAft>
+                <a:spcPct val="0"/>
+              </a:spcAft>
+              <a:buClrTx/>
+              <a:buSzTx/>
+              <a:buFontTx/>
+              <a:buNone/>
+              <a:tabLst/>
+            </a:pPr>
+            <a:r>
+              <a:rPr lang="en-US" altLang="en-US" sz="3600" b="1" u="sng" dirty="0">
+                <a:solidFill>
+                  <a:schemeClr val="accent1"/>
+                </a:solidFill>
+              </a:rPr>
+              <a:t>Question # 19</a:t>
+            </a:r>
+          </a:p>
+        </p:txBody>
+      </p:sp>
+      <p:sp>
+        <p:nvSpPr>
+          <p:cNvPr id="6" name="Rectangle 2">
+            <a:extLst>
+              <a:ext uri="{FF2B5EF4-FFF2-40B4-BE49-F238E27FC236}">
+                <a16:creationId xmlns:a16="http://schemas.microsoft.com/office/drawing/2014/main" id="{6809B999-1DF9-69DB-1E04-15A7A3C2F00F}"/>
+              </a:ext>
+            </a:extLst>
+          </p:cNvPr>
+          <p:cNvSpPr>
+            <a:spLocks noChangeArrowheads="1"/>
+          </p:cNvSpPr>
+          <p:nvPr/>
+        </p:nvSpPr>
+        <p:spPr bwMode="auto">
+          <a:xfrm rot="10800000" flipV="1">
+            <a:off x="1756878" y="1136379"/>
+            <a:ext cx="8106313" cy="5016758"/>
+          </a:xfrm>
+          <a:prstGeom prst="rect">
+            <a:avLst/>
+          </a:prstGeom>
+          <a:solidFill>
+            <a:srgbClr val="FFFFFF"/>
+          </a:solidFill>
+          <a:ln>
+            <a:noFill/>
+          </a:ln>
+          <a:effectLst/>
+          <a:extLst>
+            <a:ext uri="{91240B29-F687-4F45-9708-019B960494DF}">
+              <a14:hiddenLine xmlns:a14="http://schemas.microsoft.com/office/drawing/2010/main" w="9525">
+                <a:solidFill>
+                  <a:schemeClr val="tx1"/>
+                </a:solidFill>
+                <a:miter lim="800000"/>
+                <a:headEnd/>
+                <a:tailEnd/>
+              </a14:hiddenLine>
+            </a:ext>
+            <a:ext uri="{AF507438-7753-43E0-B8FC-AC1667EBCBE1}">
+              <a14:hiddenEffects xmlns:a14="http://schemas.microsoft.com/office/drawing/2010/main">
+                <a:effectLst>
+                  <a:outerShdw dist="35921" dir="2700000" algn="ctr" rotWithShape="0">
+                    <a:schemeClr val="bg2"/>
+                  </a:outerShdw>
+                </a:effectLst>
+              </a14:hiddenEffects>
+            </a:ext>
+          </a:extLst>
+        </p:spPr>
+        <p:txBody>
+          <a:bodyPr vert="horz" wrap="square" lIns="91440" tIns="45720" rIns="91440" bIns="45720" numCol="1" anchor="ctr" anchorCtr="0" compatLnSpc="1">
+            <a:prstTxWarp prst="textNoShape">
+              <a:avLst/>
+            </a:prstTxWarp>
+            <a:spAutoFit/>
+          </a:bodyPr>
+          <a:lstStyle>
+            <a:lvl1pPr eaLnBrk="0" fontAlgn="base" hangingPunct="0">
+              <a:spcBef>
+                <a:spcPct val="0"/>
+              </a:spcBef>
+              <a:spcAft>
+                <a:spcPct val="0"/>
+              </a:spcAft>
+              <a:defRPr>
+                <a:solidFill>
+                  <a:schemeClr val="tx1"/>
+                </a:solidFill>
+                <a:latin typeface="Arial" panose="020B0604020202020204" pitchFamily="34" charset="0"/>
+              </a:defRPr>
+            </a:lvl1pPr>
+            <a:lvl2pPr eaLnBrk="0" fontAlgn="base" hangingPunct="0">
+              <a:spcBef>
+                <a:spcPct val="0"/>
+              </a:spcBef>
+              <a:spcAft>
+                <a:spcPct val="0"/>
+              </a:spcAft>
+              <a:defRPr>
+                <a:solidFill>
+                  <a:schemeClr val="tx1"/>
+                </a:solidFill>
+                <a:latin typeface="Arial" panose="020B0604020202020204" pitchFamily="34" charset="0"/>
+              </a:defRPr>
+            </a:lvl2pPr>
+            <a:lvl3pPr eaLnBrk="0" fontAlgn="base" hangingPunct="0">
+              <a:spcBef>
+                <a:spcPct val="0"/>
+              </a:spcBef>
+              <a:spcAft>
+                <a:spcPct val="0"/>
+              </a:spcAft>
+              <a:defRPr>
+                <a:solidFill>
+                  <a:schemeClr val="tx1"/>
+                </a:solidFill>
+                <a:latin typeface="Arial" panose="020B0604020202020204" pitchFamily="34" charset="0"/>
+              </a:defRPr>
+            </a:lvl3pPr>
+            <a:lvl4pPr eaLnBrk="0" fontAlgn="base" hangingPunct="0">
+              <a:spcBef>
+                <a:spcPct val="0"/>
+              </a:spcBef>
+              <a:spcAft>
+                <a:spcPct val="0"/>
+              </a:spcAft>
+              <a:defRPr>
+                <a:solidFill>
+                  <a:schemeClr val="tx1"/>
+                </a:solidFill>
+                <a:latin typeface="Arial" panose="020B0604020202020204" pitchFamily="34" charset="0"/>
+              </a:defRPr>
+            </a:lvl4pPr>
+            <a:lvl5pPr eaLnBrk="0" fontAlgn="base" hangingPunct="0">
+              <a:spcBef>
+                <a:spcPct val="0"/>
+              </a:spcBef>
+              <a:spcAft>
+                <a:spcPct val="0"/>
+              </a:spcAft>
+              <a:defRPr>
+                <a:solidFill>
+                  <a:schemeClr val="tx1"/>
+                </a:solidFill>
+                <a:latin typeface="Arial" panose="020B0604020202020204" pitchFamily="34" charset="0"/>
+              </a:defRPr>
+            </a:lvl5pPr>
+            <a:lvl6pPr eaLnBrk="0" fontAlgn="base" hangingPunct="0">
+              <a:spcBef>
+                <a:spcPct val="0"/>
+              </a:spcBef>
+              <a:spcAft>
+                <a:spcPct val="0"/>
+              </a:spcAft>
+              <a:defRPr>
+                <a:solidFill>
+                  <a:schemeClr val="tx1"/>
+                </a:solidFill>
+                <a:latin typeface="Arial" panose="020B0604020202020204" pitchFamily="34" charset="0"/>
+              </a:defRPr>
+            </a:lvl6pPr>
+            <a:lvl7pPr eaLnBrk="0" fontAlgn="base" hangingPunct="0">
+              <a:spcBef>
+                <a:spcPct val="0"/>
+              </a:spcBef>
+              <a:spcAft>
+                <a:spcPct val="0"/>
+              </a:spcAft>
+              <a:defRPr>
+                <a:solidFill>
+                  <a:schemeClr val="tx1"/>
+                </a:solidFill>
+                <a:latin typeface="Arial" panose="020B0604020202020204" pitchFamily="34" charset="0"/>
+              </a:defRPr>
+            </a:lvl7pPr>
+            <a:lvl8pPr eaLnBrk="0" fontAlgn="base" hangingPunct="0">
+              <a:spcBef>
+                <a:spcPct val="0"/>
+              </a:spcBef>
+              <a:spcAft>
+                <a:spcPct val="0"/>
+              </a:spcAft>
+              <a:defRPr>
+                <a:solidFill>
+                  <a:schemeClr val="tx1"/>
+                </a:solidFill>
+                <a:latin typeface="Arial" panose="020B0604020202020204" pitchFamily="34" charset="0"/>
+              </a:defRPr>
+            </a:lvl8pPr>
+            <a:lvl9pPr eaLnBrk="0" fontAlgn="base" hangingPunct="0">
+              <a:spcBef>
+                <a:spcPct val="0"/>
+              </a:spcBef>
+              <a:spcAft>
+                <a:spcPct val="0"/>
+              </a:spcAft>
+              <a:defRPr>
+                <a:solidFill>
+                  <a:schemeClr val="tx1"/>
+                </a:solidFill>
+                <a:latin typeface="Arial" panose="020B0604020202020204" pitchFamily="34" charset="0"/>
+              </a:defRPr>
+            </a:lvl9pPr>
+          </a:lstStyle>
+          <a:p>
+            <a:pPr algn="ctr"/>
+            <a:r>
+              <a:rPr lang="en-US" sz="2000" b="0" i="0" dirty="0">
+                <a:solidFill>
+                  <a:srgbClr val="0D0D0D"/>
+                </a:solidFill>
+                <a:effectLst/>
+                <a:highlight>
+                  <a:srgbClr val="FFFFFF"/>
+                </a:highlight>
+                <a:cs typeface="Arial" panose="020B0604020202020204" pitchFamily="34" charset="0"/>
+              </a:rPr>
+              <a:t>Create a Persistent Volume (PV) and a corresponding Persistent Volume Claim (PVC) and then use it in a Pod.</a:t>
+            </a:r>
+          </a:p>
+          <a:p>
+            <a:pPr algn="ctr"/>
+            <a:r>
+              <a:rPr lang="en-US" altLang="en-US" sz="2000" dirty="0">
+                <a:cs typeface="Arial" panose="020B0604020202020204" pitchFamily="34" charset="0"/>
+              </a:rPr>
+              <a:t>1.Create a Persistent Volume named my-</a:t>
+            </a:r>
+            <a:r>
+              <a:rPr lang="en-US" altLang="en-US" sz="2000" dirty="0" err="1">
+                <a:cs typeface="Arial" panose="020B0604020202020204" pitchFamily="34" charset="0"/>
+              </a:rPr>
+              <a:t>pv</a:t>
+            </a:r>
+            <a:r>
+              <a:rPr lang="en-US" altLang="en-US" sz="2000" dirty="0">
+                <a:cs typeface="Arial" panose="020B0604020202020204" pitchFamily="34" charset="0"/>
+              </a:rPr>
+              <a:t> with the following specifications:</a:t>
+            </a:r>
+          </a:p>
+          <a:p>
+            <a:pPr algn="ctr"/>
+            <a:r>
+              <a:rPr lang="en-US" altLang="en-US" sz="2000" dirty="0">
+                <a:cs typeface="Arial" panose="020B0604020202020204" pitchFamily="34" charset="0"/>
+              </a:rPr>
+              <a:t>Capacity: 1Gi</a:t>
+            </a:r>
+          </a:p>
+          <a:p>
+            <a:pPr algn="ctr"/>
+            <a:r>
+              <a:rPr lang="en-US" altLang="en-US" sz="2000" dirty="0">
+                <a:cs typeface="Arial" panose="020B0604020202020204" pitchFamily="34" charset="0"/>
+              </a:rPr>
+              <a:t>Access Modes: </a:t>
+            </a:r>
+            <a:r>
+              <a:rPr lang="en-US" altLang="en-US" sz="2000" dirty="0" err="1">
+                <a:cs typeface="Arial" panose="020B0604020202020204" pitchFamily="34" charset="0"/>
+              </a:rPr>
+              <a:t>ReadWriteOnce</a:t>
+            </a:r>
+            <a:endParaRPr lang="en-US" altLang="en-US" sz="2000" dirty="0">
+              <a:cs typeface="Arial" panose="020B0604020202020204" pitchFamily="34" charset="0"/>
+            </a:endParaRPr>
+          </a:p>
+          <a:p>
+            <a:pPr algn="ctr"/>
+            <a:r>
+              <a:rPr lang="en-US" altLang="en-US" sz="2000" dirty="0" err="1">
+                <a:cs typeface="Arial" panose="020B0604020202020204" pitchFamily="34" charset="0"/>
+              </a:rPr>
+              <a:t>HostPath</a:t>
+            </a:r>
+            <a:r>
+              <a:rPr lang="en-US" altLang="en-US" sz="2000" dirty="0">
+                <a:cs typeface="Arial" panose="020B0604020202020204" pitchFamily="34" charset="0"/>
+              </a:rPr>
+              <a:t>: /</a:t>
+            </a:r>
+            <a:r>
+              <a:rPr lang="en-US" altLang="en-US" sz="2000" dirty="0" err="1">
+                <a:cs typeface="Arial" panose="020B0604020202020204" pitchFamily="34" charset="0"/>
+              </a:rPr>
+              <a:t>mnt</a:t>
+            </a:r>
+            <a:r>
+              <a:rPr lang="en-US" altLang="en-US" sz="2000" dirty="0">
+                <a:cs typeface="Arial" panose="020B0604020202020204" pitchFamily="34" charset="0"/>
+              </a:rPr>
+              <a:t>/data</a:t>
+            </a:r>
+          </a:p>
+          <a:p>
+            <a:pPr algn="ctr"/>
+            <a:r>
+              <a:rPr lang="en-US" altLang="en-US" sz="2000" dirty="0">
+                <a:cs typeface="Arial" panose="020B0604020202020204" pitchFamily="34" charset="0"/>
+              </a:rPr>
+              <a:t>Storage Class: manual</a:t>
+            </a:r>
+          </a:p>
+          <a:p>
+            <a:pPr algn="ctr"/>
+            <a:r>
+              <a:rPr lang="en-US" altLang="en-US" sz="2000" dirty="0">
+                <a:cs typeface="Arial" panose="020B0604020202020204" pitchFamily="34" charset="0"/>
+              </a:rPr>
+              <a:t>2.Create a Persistent Volume Claim named my-</a:t>
+            </a:r>
+            <a:r>
+              <a:rPr lang="en-US" altLang="en-US" sz="2000" dirty="0" err="1">
+                <a:cs typeface="Arial" panose="020B0604020202020204" pitchFamily="34" charset="0"/>
+              </a:rPr>
+              <a:t>pvc</a:t>
+            </a:r>
+            <a:r>
+              <a:rPr lang="en-US" altLang="en-US" sz="2000" dirty="0">
+                <a:cs typeface="Arial" panose="020B0604020202020204" pitchFamily="34" charset="0"/>
+              </a:rPr>
+              <a:t> with the following specifications:</a:t>
+            </a:r>
+          </a:p>
+          <a:p>
+            <a:pPr algn="ctr"/>
+            <a:r>
+              <a:rPr lang="en-US" altLang="en-US" sz="2000" dirty="0">
+                <a:cs typeface="Arial" panose="020B0604020202020204" pitchFamily="34" charset="0"/>
+              </a:rPr>
+              <a:t>Requested Storage: 1Gi</a:t>
+            </a:r>
+          </a:p>
+          <a:p>
+            <a:pPr algn="ctr"/>
+            <a:r>
+              <a:rPr lang="en-US" altLang="en-US" sz="2000" dirty="0">
+                <a:cs typeface="Arial" panose="020B0604020202020204" pitchFamily="34" charset="0"/>
+              </a:rPr>
+              <a:t>Access Modes: </a:t>
+            </a:r>
+            <a:r>
+              <a:rPr lang="en-US" altLang="en-US" sz="2000" dirty="0" err="1">
+                <a:cs typeface="Arial" panose="020B0604020202020204" pitchFamily="34" charset="0"/>
+              </a:rPr>
+              <a:t>ReadWriteOnce</a:t>
+            </a:r>
+            <a:endParaRPr lang="en-US" altLang="en-US" sz="2000" dirty="0">
+              <a:cs typeface="Arial" panose="020B0604020202020204" pitchFamily="34" charset="0"/>
+            </a:endParaRPr>
+          </a:p>
+          <a:p>
+            <a:pPr algn="ctr"/>
+            <a:r>
+              <a:rPr lang="en-US" altLang="en-US" sz="2000" dirty="0">
+                <a:cs typeface="Arial" panose="020B0604020202020204" pitchFamily="34" charset="0"/>
+              </a:rPr>
+              <a:t>Storage Class: manual</a:t>
+            </a:r>
+          </a:p>
+          <a:p>
+            <a:pPr algn="ctr"/>
+            <a:r>
+              <a:rPr lang="en-US" altLang="en-US" sz="2000" dirty="0">
+                <a:cs typeface="Arial" panose="020B0604020202020204" pitchFamily="34" charset="0"/>
+              </a:rPr>
+              <a:t>3.Create mount the volume at /</a:t>
+            </a:r>
+            <a:r>
+              <a:rPr lang="en-US" altLang="en-US" sz="2000" dirty="0" err="1">
+                <a:cs typeface="Arial" panose="020B0604020202020204" pitchFamily="34" charset="0"/>
+              </a:rPr>
+              <a:t>usr</a:t>
+            </a:r>
+            <a:r>
+              <a:rPr lang="en-US" altLang="en-US" sz="2000" dirty="0">
+                <a:cs typeface="Arial" panose="020B0604020202020204" pitchFamily="34" charset="0"/>
+              </a:rPr>
+              <a:t>/share Pod named nginx-pod that uses the PVC my-</a:t>
+            </a:r>
+            <a:r>
+              <a:rPr lang="en-US" altLang="en-US" sz="2000" dirty="0" err="1">
+                <a:cs typeface="Arial" panose="020B0604020202020204" pitchFamily="34" charset="0"/>
+              </a:rPr>
+              <a:t>pvc</a:t>
+            </a:r>
+            <a:r>
+              <a:rPr lang="en-US" altLang="en-US" sz="2000" dirty="0">
+                <a:cs typeface="Arial" panose="020B0604020202020204" pitchFamily="34" charset="0"/>
+              </a:rPr>
+              <a:t> to are/nginx/html.</a:t>
+            </a:r>
+          </a:p>
+          <a:p>
+            <a:pPr algn="ctr"/>
+            <a:r>
+              <a:rPr lang="en-US" altLang="en-US" sz="2000" dirty="0">
+                <a:cs typeface="Arial" panose="020B0604020202020204" pitchFamily="34" charset="0"/>
+              </a:rPr>
+              <a:t>4.Verify that the Pod is running and using the Persistent Volume.</a:t>
+            </a:r>
+          </a:p>
+        </p:txBody>
+      </p:sp>
+    </p:spTree>
+    <p:extLst>
+      <p:ext uri="{BB962C8B-B14F-4D97-AF65-F5344CB8AC3E}">
+        <p14:creationId xmlns:p14="http://schemas.microsoft.com/office/powerpoint/2010/main" val="2337974823"/>
+      </p:ext>
+    </p:extLst>
+  </p:cSld>
+  <p:clrMapOvr>
+    <a:masterClrMapping/>
+  </p:clrMapOvr>
+</p:sld>
+</file>
+
 <file path=ppt/slides/slide2.xml><?xml version="1.0" encoding="utf-8"?>
 <p:sld xmlns:a="http://schemas.openxmlformats.org/drawingml/2006/main" xmlns:r="http://schemas.openxmlformats.org/officeDocument/2006/relationships" xmlns:p="http://schemas.openxmlformats.org/presentationml/2006/main">
   <p:cSld>
@@ -7013,6 +9876,522 @@
     <p:extLst>
       <p:ext uri="{BB962C8B-B14F-4D97-AF65-F5344CB8AC3E}">
         <p14:creationId xmlns:p14="http://schemas.microsoft.com/office/powerpoint/2010/main" val="2213673584"/>
+      </p:ext>
+    </p:extLst>
+  </p:cSld>
+  <p:clrMapOvr>
+    <a:masterClrMapping/>
+  </p:clrMapOvr>
+</p:sld>
+</file>
+
+<file path=ppt/slides/slide20.xml><?xml version="1.0" encoding="utf-8"?>
+<p:sld xmlns:a="http://schemas.openxmlformats.org/drawingml/2006/main" xmlns:r="http://schemas.openxmlformats.org/officeDocument/2006/relationships" xmlns:p="http://schemas.openxmlformats.org/presentationml/2006/main">
+  <p:cSld>
+    <p:spTree>
+      <p:nvGrpSpPr>
+        <p:cNvPr id="1" name=""/>
+        <p:cNvGrpSpPr/>
+        <p:nvPr/>
+      </p:nvGrpSpPr>
+      <p:grpSpPr>
+        <a:xfrm>
+          <a:off x="0" y="0"/>
+          <a:ext cx="0" cy="0"/>
+          <a:chOff x="0" y="0"/>
+          <a:chExt cx="0" cy="0"/>
+        </a:xfrm>
+      </p:grpSpPr>
+      <p:sp>
+        <p:nvSpPr>
+          <p:cNvPr id="5" name="Rectangle 2">
+            <a:extLst>
+              <a:ext uri="{FF2B5EF4-FFF2-40B4-BE49-F238E27FC236}">
+                <a16:creationId xmlns:a16="http://schemas.microsoft.com/office/drawing/2014/main" id="{F178CF33-752E-0E50-F24B-A2AF2687EBBE}"/>
+              </a:ext>
+            </a:extLst>
+          </p:cNvPr>
+          <p:cNvSpPr>
+            <a:spLocks noChangeArrowheads="1"/>
+          </p:cNvSpPr>
+          <p:nvPr/>
+        </p:nvSpPr>
+        <p:spPr bwMode="auto">
+          <a:xfrm rot="10800000" flipV="1">
+            <a:off x="3780887" y="1187137"/>
+            <a:ext cx="3996647" cy="646331"/>
+          </a:xfrm>
+          <a:prstGeom prst="rect">
+            <a:avLst/>
+          </a:prstGeom>
+          <a:solidFill>
+            <a:srgbClr val="FFFFFF"/>
+          </a:solidFill>
+          <a:ln>
+            <a:noFill/>
+          </a:ln>
+          <a:effectLst/>
+          <a:extLst>
+            <a:ext uri="{91240B29-F687-4F45-9708-019B960494DF}">
+              <a14:hiddenLine xmlns:a14="http://schemas.microsoft.com/office/drawing/2010/main" w="9525">
+                <a:solidFill>
+                  <a:schemeClr val="tx1"/>
+                </a:solidFill>
+                <a:miter lim="800000"/>
+                <a:headEnd/>
+                <a:tailEnd/>
+              </a14:hiddenLine>
+            </a:ext>
+            <a:ext uri="{AF507438-7753-43E0-B8FC-AC1667EBCBE1}">
+              <a14:hiddenEffects xmlns:a14="http://schemas.microsoft.com/office/drawing/2010/main">
+                <a:effectLst>
+                  <a:outerShdw dist="35921" dir="2700000" algn="ctr" rotWithShape="0">
+                    <a:schemeClr val="bg2"/>
+                  </a:outerShdw>
+                </a:effectLst>
+              </a14:hiddenEffects>
+            </a:ext>
+          </a:extLst>
+        </p:spPr>
+        <p:txBody>
+          <a:bodyPr vert="horz" wrap="square" lIns="91440" tIns="45720" rIns="91440" bIns="45720" numCol="1" anchor="ctr" anchorCtr="0" compatLnSpc="1">
+            <a:prstTxWarp prst="textNoShape">
+              <a:avLst/>
+            </a:prstTxWarp>
+            <a:spAutoFit/>
+          </a:bodyPr>
+          <a:lstStyle>
+            <a:lvl1pPr eaLnBrk="0" fontAlgn="base" hangingPunct="0">
+              <a:spcBef>
+                <a:spcPct val="0"/>
+              </a:spcBef>
+              <a:spcAft>
+                <a:spcPct val="0"/>
+              </a:spcAft>
+              <a:defRPr>
+                <a:solidFill>
+                  <a:schemeClr val="tx1"/>
+                </a:solidFill>
+                <a:latin typeface="Arial" panose="020B0604020202020204" pitchFamily="34" charset="0"/>
+              </a:defRPr>
+            </a:lvl1pPr>
+            <a:lvl2pPr eaLnBrk="0" fontAlgn="base" hangingPunct="0">
+              <a:spcBef>
+                <a:spcPct val="0"/>
+              </a:spcBef>
+              <a:spcAft>
+                <a:spcPct val="0"/>
+              </a:spcAft>
+              <a:defRPr>
+                <a:solidFill>
+                  <a:schemeClr val="tx1"/>
+                </a:solidFill>
+                <a:latin typeface="Arial" panose="020B0604020202020204" pitchFamily="34" charset="0"/>
+              </a:defRPr>
+            </a:lvl2pPr>
+            <a:lvl3pPr eaLnBrk="0" fontAlgn="base" hangingPunct="0">
+              <a:spcBef>
+                <a:spcPct val="0"/>
+              </a:spcBef>
+              <a:spcAft>
+                <a:spcPct val="0"/>
+              </a:spcAft>
+              <a:defRPr>
+                <a:solidFill>
+                  <a:schemeClr val="tx1"/>
+                </a:solidFill>
+                <a:latin typeface="Arial" panose="020B0604020202020204" pitchFamily="34" charset="0"/>
+              </a:defRPr>
+            </a:lvl3pPr>
+            <a:lvl4pPr eaLnBrk="0" fontAlgn="base" hangingPunct="0">
+              <a:spcBef>
+                <a:spcPct val="0"/>
+              </a:spcBef>
+              <a:spcAft>
+                <a:spcPct val="0"/>
+              </a:spcAft>
+              <a:defRPr>
+                <a:solidFill>
+                  <a:schemeClr val="tx1"/>
+                </a:solidFill>
+                <a:latin typeface="Arial" panose="020B0604020202020204" pitchFamily="34" charset="0"/>
+              </a:defRPr>
+            </a:lvl4pPr>
+            <a:lvl5pPr eaLnBrk="0" fontAlgn="base" hangingPunct="0">
+              <a:spcBef>
+                <a:spcPct val="0"/>
+              </a:spcBef>
+              <a:spcAft>
+                <a:spcPct val="0"/>
+              </a:spcAft>
+              <a:defRPr>
+                <a:solidFill>
+                  <a:schemeClr val="tx1"/>
+                </a:solidFill>
+                <a:latin typeface="Arial" panose="020B0604020202020204" pitchFamily="34" charset="0"/>
+              </a:defRPr>
+            </a:lvl5pPr>
+            <a:lvl6pPr eaLnBrk="0" fontAlgn="base" hangingPunct="0">
+              <a:spcBef>
+                <a:spcPct val="0"/>
+              </a:spcBef>
+              <a:spcAft>
+                <a:spcPct val="0"/>
+              </a:spcAft>
+              <a:defRPr>
+                <a:solidFill>
+                  <a:schemeClr val="tx1"/>
+                </a:solidFill>
+                <a:latin typeface="Arial" panose="020B0604020202020204" pitchFamily="34" charset="0"/>
+              </a:defRPr>
+            </a:lvl6pPr>
+            <a:lvl7pPr eaLnBrk="0" fontAlgn="base" hangingPunct="0">
+              <a:spcBef>
+                <a:spcPct val="0"/>
+              </a:spcBef>
+              <a:spcAft>
+                <a:spcPct val="0"/>
+              </a:spcAft>
+              <a:defRPr>
+                <a:solidFill>
+                  <a:schemeClr val="tx1"/>
+                </a:solidFill>
+                <a:latin typeface="Arial" panose="020B0604020202020204" pitchFamily="34" charset="0"/>
+              </a:defRPr>
+            </a:lvl7pPr>
+            <a:lvl8pPr eaLnBrk="0" fontAlgn="base" hangingPunct="0">
+              <a:spcBef>
+                <a:spcPct val="0"/>
+              </a:spcBef>
+              <a:spcAft>
+                <a:spcPct val="0"/>
+              </a:spcAft>
+              <a:defRPr>
+                <a:solidFill>
+                  <a:schemeClr val="tx1"/>
+                </a:solidFill>
+                <a:latin typeface="Arial" panose="020B0604020202020204" pitchFamily="34" charset="0"/>
+              </a:defRPr>
+            </a:lvl8pPr>
+            <a:lvl9pPr eaLnBrk="0" fontAlgn="base" hangingPunct="0">
+              <a:spcBef>
+                <a:spcPct val="0"/>
+              </a:spcBef>
+              <a:spcAft>
+                <a:spcPct val="0"/>
+              </a:spcAft>
+              <a:defRPr>
+                <a:solidFill>
+                  <a:schemeClr val="tx1"/>
+                </a:solidFill>
+                <a:latin typeface="Arial" panose="020B0604020202020204" pitchFamily="34" charset="0"/>
+              </a:defRPr>
+            </a:lvl9pPr>
+          </a:lstStyle>
+          <a:p>
+            <a:pPr marL="0" marR="0" lvl="0" indent="0" algn="ctr" defTabSz="914400" rtl="0" eaLnBrk="0" fontAlgn="base" latinLnBrk="0" hangingPunct="0">
+              <a:lnSpc>
+                <a:spcPct val="100000"/>
+              </a:lnSpc>
+              <a:spcBef>
+                <a:spcPct val="0"/>
+              </a:spcBef>
+              <a:spcAft>
+                <a:spcPct val="0"/>
+              </a:spcAft>
+              <a:buClrTx/>
+              <a:buSzTx/>
+              <a:buFontTx/>
+              <a:buNone/>
+              <a:tabLst/>
+            </a:pPr>
+            <a:r>
+              <a:rPr lang="en-US" altLang="en-US" sz="3600" b="1" u="sng" dirty="0">
+                <a:solidFill>
+                  <a:schemeClr val="accent1"/>
+                </a:solidFill>
+              </a:rPr>
+              <a:t>Question # 20</a:t>
+            </a:r>
+          </a:p>
+        </p:txBody>
+      </p:sp>
+      <p:sp>
+        <p:nvSpPr>
+          <p:cNvPr id="6" name="Rectangle 2">
+            <a:extLst>
+              <a:ext uri="{FF2B5EF4-FFF2-40B4-BE49-F238E27FC236}">
+                <a16:creationId xmlns:a16="http://schemas.microsoft.com/office/drawing/2014/main" id="{6809B999-1DF9-69DB-1E04-15A7A3C2F00F}"/>
+              </a:ext>
+            </a:extLst>
+          </p:cNvPr>
+          <p:cNvSpPr>
+            <a:spLocks noChangeArrowheads="1"/>
+          </p:cNvSpPr>
+          <p:nvPr/>
+        </p:nvSpPr>
+        <p:spPr bwMode="auto">
+          <a:xfrm rot="10800000" flipV="1">
+            <a:off x="1900715" y="2202203"/>
+            <a:ext cx="8106313" cy="1323439"/>
+          </a:xfrm>
+          <a:prstGeom prst="rect">
+            <a:avLst/>
+          </a:prstGeom>
+          <a:solidFill>
+            <a:srgbClr val="FFFFFF"/>
+          </a:solidFill>
+          <a:ln>
+            <a:noFill/>
+          </a:ln>
+          <a:effectLst/>
+          <a:extLst>
+            <a:ext uri="{91240B29-F687-4F45-9708-019B960494DF}">
+              <a14:hiddenLine xmlns:a14="http://schemas.microsoft.com/office/drawing/2010/main" w="9525">
+                <a:solidFill>
+                  <a:schemeClr val="tx1"/>
+                </a:solidFill>
+                <a:miter lim="800000"/>
+                <a:headEnd/>
+                <a:tailEnd/>
+              </a14:hiddenLine>
+            </a:ext>
+            <a:ext uri="{AF507438-7753-43E0-B8FC-AC1667EBCBE1}">
+              <a14:hiddenEffects xmlns:a14="http://schemas.microsoft.com/office/drawing/2010/main">
+                <a:effectLst>
+                  <a:outerShdw dist="35921" dir="2700000" algn="ctr" rotWithShape="0">
+                    <a:schemeClr val="bg2"/>
+                  </a:outerShdw>
+                </a:effectLst>
+              </a14:hiddenEffects>
+            </a:ext>
+          </a:extLst>
+        </p:spPr>
+        <p:txBody>
+          <a:bodyPr vert="horz" wrap="square" lIns="91440" tIns="45720" rIns="91440" bIns="45720" numCol="1" anchor="ctr" anchorCtr="0" compatLnSpc="1">
+            <a:prstTxWarp prst="textNoShape">
+              <a:avLst/>
+            </a:prstTxWarp>
+            <a:spAutoFit/>
+          </a:bodyPr>
+          <a:lstStyle>
+            <a:lvl1pPr eaLnBrk="0" fontAlgn="base" hangingPunct="0">
+              <a:spcBef>
+                <a:spcPct val="0"/>
+              </a:spcBef>
+              <a:spcAft>
+                <a:spcPct val="0"/>
+              </a:spcAft>
+              <a:defRPr>
+                <a:solidFill>
+                  <a:schemeClr val="tx1"/>
+                </a:solidFill>
+                <a:latin typeface="Arial" panose="020B0604020202020204" pitchFamily="34" charset="0"/>
+              </a:defRPr>
+            </a:lvl1pPr>
+            <a:lvl2pPr eaLnBrk="0" fontAlgn="base" hangingPunct="0">
+              <a:spcBef>
+                <a:spcPct val="0"/>
+              </a:spcBef>
+              <a:spcAft>
+                <a:spcPct val="0"/>
+              </a:spcAft>
+              <a:defRPr>
+                <a:solidFill>
+                  <a:schemeClr val="tx1"/>
+                </a:solidFill>
+                <a:latin typeface="Arial" panose="020B0604020202020204" pitchFamily="34" charset="0"/>
+              </a:defRPr>
+            </a:lvl2pPr>
+            <a:lvl3pPr eaLnBrk="0" fontAlgn="base" hangingPunct="0">
+              <a:spcBef>
+                <a:spcPct val="0"/>
+              </a:spcBef>
+              <a:spcAft>
+                <a:spcPct val="0"/>
+              </a:spcAft>
+              <a:defRPr>
+                <a:solidFill>
+                  <a:schemeClr val="tx1"/>
+                </a:solidFill>
+                <a:latin typeface="Arial" panose="020B0604020202020204" pitchFamily="34" charset="0"/>
+              </a:defRPr>
+            </a:lvl3pPr>
+            <a:lvl4pPr eaLnBrk="0" fontAlgn="base" hangingPunct="0">
+              <a:spcBef>
+                <a:spcPct val="0"/>
+              </a:spcBef>
+              <a:spcAft>
+                <a:spcPct val="0"/>
+              </a:spcAft>
+              <a:defRPr>
+                <a:solidFill>
+                  <a:schemeClr val="tx1"/>
+                </a:solidFill>
+                <a:latin typeface="Arial" panose="020B0604020202020204" pitchFamily="34" charset="0"/>
+              </a:defRPr>
+            </a:lvl4pPr>
+            <a:lvl5pPr eaLnBrk="0" fontAlgn="base" hangingPunct="0">
+              <a:spcBef>
+                <a:spcPct val="0"/>
+              </a:spcBef>
+              <a:spcAft>
+                <a:spcPct val="0"/>
+              </a:spcAft>
+              <a:defRPr>
+                <a:solidFill>
+                  <a:schemeClr val="tx1"/>
+                </a:solidFill>
+                <a:latin typeface="Arial" panose="020B0604020202020204" pitchFamily="34" charset="0"/>
+              </a:defRPr>
+            </a:lvl5pPr>
+            <a:lvl6pPr eaLnBrk="0" fontAlgn="base" hangingPunct="0">
+              <a:spcBef>
+                <a:spcPct val="0"/>
+              </a:spcBef>
+              <a:spcAft>
+                <a:spcPct val="0"/>
+              </a:spcAft>
+              <a:defRPr>
+                <a:solidFill>
+                  <a:schemeClr val="tx1"/>
+                </a:solidFill>
+                <a:latin typeface="Arial" panose="020B0604020202020204" pitchFamily="34" charset="0"/>
+              </a:defRPr>
+            </a:lvl6pPr>
+            <a:lvl7pPr eaLnBrk="0" fontAlgn="base" hangingPunct="0">
+              <a:spcBef>
+                <a:spcPct val="0"/>
+              </a:spcBef>
+              <a:spcAft>
+                <a:spcPct val="0"/>
+              </a:spcAft>
+              <a:defRPr>
+                <a:solidFill>
+                  <a:schemeClr val="tx1"/>
+                </a:solidFill>
+                <a:latin typeface="Arial" panose="020B0604020202020204" pitchFamily="34" charset="0"/>
+              </a:defRPr>
+            </a:lvl7pPr>
+            <a:lvl8pPr eaLnBrk="0" fontAlgn="base" hangingPunct="0">
+              <a:spcBef>
+                <a:spcPct val="0"/>
+              </a:spcBef>
+              <a:spcAft>
+                <a:spcPct val="0"/>
+              </a:spcAft>
+              <a:defRPr>
+                <a:solidFill>
+                  <a:schemeClr val="tx1"/>
+                </a:solidFill>
+                <a:latin typeface="Arial" panose="020B0604020202020204" pitchFamily="34" charset="0"/>
+              </a:defRPr>
+            </a:lvl8pPr>
+            <a:lvl9pPr eaLnBrk="0" fontAlgn="base" hangingPunct="0">
+              <a:spcBef>
+                <a:spcPct val="0"/>
+              </a:spcBef>
+              <a:spcAft>
+                <a:spcPct val="0"/>
+              </a:spcAft>
+              <a:defRPr>
+                <a:solidFill>
+                  <a:schemeClr val="tx1"/>
+                </a:solidFill>
+                <a:latin typeface="Arial" panose="020B0604020202020204" pitchFamily="34" charset="0"/>
+              </a:defRPr>
+            </a:lvl9pPr>
+          </a:lstStyle>
+          <a:p>
+            <a:pPr algn="ctr"/>
+            <a:r>
+              <a:rPr lang="en-US" altLang="en-US" sz="2000" dirty="0">
+                <a:cs typeface="Arial" panose="020B0604020202020204" pitchFamily="34" charset="0"/>
+              </a:rPr>
+              <a:t>Create a new user “</a:t>
+            </a:r>
+            <a:r>
+              <a:rPr lang="en-US" altLang="en-US" sz="2000" dirty="0" err="1">
+                <a:cs typeface="Arial" panose="020B0604020202020204" pitchFamily="34" charset="0"/>
+              </a:rPr>
+              <a:t>sam</a:t>
+            </a:r>
+            <a:r>
+              <a:rPr lang="en-US" altLang="en-US" sz="2000" dirty="0">
+                <a:cs typeface="Arial" panose="020B0604020202020204" pitchFamily="34" charset="0"/>
+              </a:rPr>
+              <a:t>” .Grant him access to the cluster.</a:t>
+            </a:r>
+          </a:p>
+          <a:p>
+            <a:pPr algn="ctr"/>
+            <a:r>
+              <a:rPr lang="en-US" altLang="en-US" sz="2000" dirty="0">
+                <a:cs typeface="Arial" panose="020B0604020202020204" pitchFamily="34" charset="0"/>
+              </a:rPr>
+              <a:t>User “</a:t>
+            </a:r>
+            <a:r>
+              <a:rPr lang="en-US" altLang="en-US" sz="2000" dirty="0" err="1">
+                <a:cs typeface="Arial" panose="020B0604020202020204" pitchFamily="34" charset="0"/>
+              </a:rPr>
+              <a:t>sam</a:t>
+            </a:r>
+            <a:r>
+              <a:rPr lang="en-US" altLang="en-US" sz="2000" dirty="0">
+                <a:cs typeface="Arial" panose="020B0604020202020204" pitchFamily="34" charset="0"/>
+              </a:rPr>
+              <a:t>” should have permission to create, list, get, update and delete pods. The private key exists at location:</a:t>
+            </a:r>
+          </a:p>
+          <a:p>
+            <a:pPr algn="ctr"/>
+            <a:r>
+              <a:rPr lang="en-US" altLang="en-US" sz="2000" dirty="0">
+                <a:cs typeface="Arial" panose="020B0604020202020204" pitchFamily="34" charset="0"/>
+              </a:rPr>
+              <a:t>/root/</a:t>
+            </a:r>
+            <a:r>
+              <a:rPr lang="en-US" altLang="en-US" sz="2000" dirty="0" err="1">
+                <a:cs typeface="Arial" panose="020B0604020202020204" pitchFamily="34" charset="0"/>
+              </a:rPr>
+              <a:t>sam</a:t>
+            </a:r>
+            <a:r>
+              <a:rPr lang="en-US" altLang="en-US" sz="2000" dirty="0">
+                <a:cs typeface="Arial" panose="020B0604020202020204" pitchFamily="34" charset="0"/>
+              </a:rPr>
+              <a:t>/.key and </a:t>
+            </a:r>
+            <a:r>
+              <a:rPr lang="en-US" altLang="en-US" sz="2000" dirty="0" err="1">
+                <a:cs typeface="Arial" panose="020B0604020202020204" pitchFamily="34" charset="0"/>
+              </a:rPr>
+              <a:t>csr</a:t>
+            </a:r>
+            <a:r>
+              <a:rPr lang="en-US" altLang="en-US" sz="2000" dirty="0">
+                <a:cs typeface="Arial" panose="020B0604020202020204" pitchFamily="34" charset="0"/>
+              </a:rPr>
+              <a:t> at /root/</a:t>
+            </a:r>
+            <a:r>
+              <a:rPr lang="en-US" altLang="en-US" sz="2000" dirty="0" err="1">
+                <a:cs typeface="Arial" panose="020B0604020202020204" pitchFamily="34" charset="0"/>
+              </a:rPr>
+              <a:t>sam.csr</a:t>
+            </a:r>
+            <a:endParaRPr lang="en-US" altLang="en-US" sz="2000" dirty="0">
+              <a:cs typeface="Arial" panose="020B0604020202020204" pitchFamily="34" charset="0"/>
+            </a:endParaRPr>
+          </a:p>
+        </p:txBody>
+      </p:sp>
+    </p:spTree>
+    <p:extLst>
+      <p:ext uri="{BB962C8B-B14F-4D97-AF65-F5344CB8AC3E}">
+        <p14:creationId xmlns:p14="http://schemas.microsoft.com/office/powerpoint/2010/main" val="2455982737"/>
       </p:ext>
     </p:extLst>
   </p:cSld>

</xml_diff>